<commit_message>
Move files and small tweaks
</commit_message>
<xml_diff>
--- a/slides.pptx
+++ b/slides.pptx
@@ -5,16 +5,15 @@
     <p:sldMasterId id="2147483648" r:id="rId1"/>
   </p:sldMasterIdLst>
   <p:notesMasterIdLst>
-    <p:notesMasterId r:id="rId9"/>
+    <p:notesMasterId r:id="rId8"/>
   </p:notesMasterIdLst>
   <p:sldIdLst>
     <p:sldId id="256" r:id="rId2"/>
-    <p:sldId id="257" r:id="rId3"/>
-    <p:sldId id="288" r:id="rId4"/>
-    <p:sldId id="289" r:id="rId5"/>
-    <p:sldId id="263" r:id="rId6"/>
-    <p:sldId id="264" r:id="rId7"/>
-    <p:sldId id="266" r:id="rId8"/>
+    <p:sldId id="288" r:id="rId3"/>
+    <p:sldId id="289" r:id="rId4"/>
+    <p:sldId id="263" r:id="rId5"/>
+    <p:sldId id="264" r:id="rId6"/>
+    <p:sldId id="266" r:id="rId7"/>
   </p:sldIdLst>
   <p:sldSz cx="12192000" cy="6858000"/>
   <p:notesSz cx="6858000" cy="9144000"/>
@@ -119,7 +118,6 @@
         <p14:section name="Title page" id="{2CCD16A2-9EF6-4F56-A5FF-A51AF0E40F6A}">
           <p14:sldIdLst>
             <p14:sldId id="256"/>
-            <p14:sldId id="257"/>
           </p14:sldIdLst>
         </p14:section>
         <p14:section name="Week 2 - lists, ifs, loops" id="{FB578273-FB69-4C74-870A-1CBB668726A2}">
@@ -222,7 +220,7 @@
           <a:p>
             <a:fld id="{D5CCF024-8058-4E92-8B35-074515495720}" type="datetimeFigureOut">
               <a:rPr lang="en-GB" smtClean="0"/>
-              <a:t>23/01/2017</a:t>
+              <a:t>08/02/2017</a:t>
             </a:fld>
             <a:endParaRPr lang="en-GB"/>
           </a:p>
@@ -688,7 +686,7 @@
           <a:p>
             <a:fld id="{6E50C31B-5128-4CB2-8D4B-CBF503D17F3C}" type="slidenum">
               <a:rPr lang="en-GB" smtClean="0"/>
-              <a:t>3</a:t>
+              <a:t>2</a:t>
             </a:fld>
             <a:endParaRPr lang="en-GB"/>
           </a:p>
@@ -781,7 +779,7 @@
           <a:p>
             <a:fld id="{6E50C31B-5128-4CB2-8D4B-CBF503D17F3C}" type="slidenum">
               <a:rPr lang="en-GB" smtClean="0"/>
-              <a:t>4</a:t>
+              <a:t>3</a:t>
             </a:fld>
             <a:endParaRPr lang="en-GB"/>
           </a:p>
@@ -868,7 +866,7 @@
           <a:p>
             <a:fld id="{6E50C31B-5128-4CB2-8D4B-CBF503D17F3C}" type="slidenum">
               <a:rPr lang="en-GB" smtClean="0"/>
-              <a:t>5</a:t>
+              <a:t>4</a:t>
             </a:fld>
             <a:endParaRPr lang="en-GB"/>
           </a:p>
@@ -983,7 +981,7 @@
           <a:p>
             <a:fld id="{6E50C31B-5128-4CB2-8D4B-CBF503D17F3C}" type="slidenum">
               <a:rPr lang="en-GB" smtClean="0"/>
-              <a:t>6</a:t>
+              <a:t>5</a:t>
             </a:fld>
             <a:endParaRPr lang="en-GB"/>
           </a:p>
@@ -1052,7 +1050,7 @@
           <a:noFill/>
           <a:extLst>
             <a:ext uri="{909E8E84-426E-40dd-AFC4-6F175D3DCCD1}">
-              <a14:hiddenFill xmlns:a14="http://schemas.microsoft.com/office/drawing/2010/main" xmlns="">
+              <a14:hiddenFill xmlns="" xmlns:a14="http://schemas.microsoft.com/office/drawing/2010/main">
                 <a:solidFill>
                   <a:srgbClr val="FFFFFF"/>
                 </a:solidFill>
@@ -1112,7 +1110,7 @@
             </a:ln>
             <a:extLst>
               <a:ext uri="{91240B29-F687-4f45-9708-019B960494DF}">
-                <a14:hiddenLine xmlns:a14="http://schemas.microsoft.com/office/drawing/2010/main" xmlns="" w="9525">
+                <a14:hiddenLine xmlns="" xmlns:a14="http://schemas.microsoft.com/office/drawing/2010/main" w="9525">
                   <a:solidFill>
                     <a:srgbClr val="000000"/>
                   </a:solidFill>
@@ -1202,7 +1200,7 @@
             </a:ln>
             <a:extLst>
               <a:ext uri="{91240B29-F687-4f45-9708-019B960494DF}">
-                <a14:hiddenLine xmlns:a14="http://schemas.microsoft.com/office/drawing/2010/main" xmlns="" w="9525">
+                <a14:hiddenLine xmlns="" xmlns:a14="http://schemas.microsoft.com/office/drawing/2010/main" w="9525">
                   <a:solidFill>
                     <a:srgbClr val="000000"/>
                   </a:solidFill>
@@ -1292,7 +1290,7 @@
             </a:ln>
             <a:extLst>
               <a:ext uri="{91240B29-F687-4f45-9708-019B960494DF}">
-                <a14:hiddenLine xmlns:a14="http://schemas.microsoft.com/office/drawing/2010/main" xmlns="" w="9525">
+                <a14:hiddenLine xmlns="" xmlns:a14="http://schemas.microsoft.com/office/drawing/2010/main" w="9525">
                   <a:solidFill>
                     <a:srgbClr val="000000"/>
                   </a:solidFill>
@@ -1326,7 +1324,7 @@
             </a:ln>
             <a:extLst>
               <a:ext uri="{91240B29-F687-4f45-9708-019B960494DF}">
-                <a14:hiddenLine xmlns:a14="http://schemas.microsoft.com/office/drawing/2010/main" xmlns="" w="9525">
+                <a14:hiddenLine xmlns="" xmlns:a14="http://schemas.microsoft.com/office/drawing/2010/main" w="9525">
                   <a:solidFill>
                     <a:srgbClr val="000000"/>
                   </a:solidFill>
@@ -1416,7 +1414,7 @@
             </a:ln>
             <a:extLst>
               <a:ext uri="{91240B29-F687-4f45-9708-019B960494DF}">
-                <a14:hiddenLine xmlns:a14="http://schemas.microsoft.com/office/drawing/2010/main" xmlns="" w="9525">
+                <a14:hiddenLine xmlns="" xmlns:a14="http://schemas.microsoft.com/office/drawing/2010/main" w="9525">
                   <a:solidFill>
                     <a:srgbClr val="000000"/>
                   </a:solidFill>
@@ -1478,7 +1476,7 @@
             </a:ln>
             <a:extLst>
               <a:ext uri="{91240B29-F687-4f45-9708-019B960494DF}">
-                <a14:hiddenLine xmlns:a14="http://schemas.microsoft.com/office/drawing/2010/main" xmlns="" w="9525">
+                <a14:hiddenLine xmlns="" xmlns:a14="http://schemas.microsoft.com/office/drawing/2010/main" w="9525">
                   <a:solidFill>
                     <a:srgbClr val="000000"/>
                   </a:solidFill>
@@ -1540,7 +1538,7 @@
             </a:ln>
             <a:extLst>
               <a:ext uri="{91240B29-F687-4f45-9708-019B960494DF}">
-                <a14:hiddenLine xmlns:a14="http://schemas.microsoft.com/office/drawing/2010/main" xmlns="" w="9525">
+                <a14:hiddenLine xmlns="" xmlns:a14="http://schemas.microsoft.com/office/drawing/2010/main" w="9525">
                   <a:solidFill>
                     <a:srgbClr val="000000"/>
                   </a:solidFill>
@@ -1630,7 +1628,7 @@
             </a:ln>
             <a:extLst>
               <a:ext uri="{91240B29-F687-4f45-9708-019B960494DF}">
-                <a14:hiddenLine xmlns:a14="http://schemas.microsoft.com/office/drawing/2010/main" xmlns="" w="9525">
+                <a14:hiddenLine xmlns="" xmlns:a14="http://schemas.microsoft.com/office/drawing/2010/main" w="9525">
                   <a:solidFill>
                     <a:srgbClr val="000000"/>
                   </a:solidFill>
@@ -1692,7 +1690,7 @@
             </a:ln>
             <a:extLst>
               <a:ext uri="{91240B29-F687-4f45-9708-019B960494DF}">
-                <a14:hiddenLine xmlns:a14="http://schemas.microsoft.com/office/drawing/2010/main" xmlns="" w="9525">
+                <a14:hiddenLine xmlns="" xmlns:a14="http://schemas.microsoft.com/office/drawing/2010/main" w="9525">
                   <a:solidFill>
                     <a:srgbClr val="000000"/>
                   </a:solidFill>
@@ -1754,7 +1752,7 @@
             </a:ln>
             <a:extLst>
               <a:ext uri="{91240B29-F687-4f45-9708-019B960494DF}">
-                <a14:hiddenLine xmlns:a14="http://schemas.microsoft.com/office/drawing/2010/main" xmlns="" w="9525">
+                <a14:hiddenLine xmlns="" xmlns:a14="http://schemas.microsoft.com/office/drawing/2010/main" w="9525">
                   <a:solidFill>
                     <a:srgbClr val="000000"/>
                   </a:solidFill>
@@ -1844,7 +1842,7 @@
             </a:ln>
             <a:extLst>
               <a:ext uri="{91240B29-F687-4f45-9708-019B960494DF}">
-                <a14:hiddenLine xmlns:a14="http://schemas.microsoft.com/office/drawing/2010/main" xmlns="" w="9525">
+                <a14:hiddenLine xmlns="" xmlns:a14="http://schemas.microsoft.com/office/drawing/2010/main" w="9525">
                   <a:solidFill>
                     <a:srgbClr val="000000"/>
                   </a:solidFill>
@@ -1934,7 +1932,7 @@
             </a:ln>
             <a:extLst>
               <a:ext uri="{91240B29-F687-4f45-9708-019B960494DF}">
-                <a14:hiddenLine xmlns:a14="http://schemas.microsoft.com/office/drawing/2010/main" xmlns="" w="9525">
+                <a14:hiddenLine xmlns="" xmlns:a14="http://schemas.microsoft.com/office/drawing/2010/main" w="9525">
                   <a:solidFill>
                     <a:srgbClr val="000000"/>
                   </a:solidFill>
@@ -1996,7 +1994,7 @@
             </a:ln>
             <a:extLst>
               <a:ext uri="{91240B29-F687-4f45-9708-019B960494DF}">
-                <a14:hiddenLine xmlns:a14="http://schemas.microsoft.com/office/drawing/2010/main" xmlns="" w="9525">
+                <a14:hiddenLine xmlns="" xmlns:a14="http://schemas.microsoft.com/office/drawing/2010/main" w="9525">
                   <a:solidFill>
                     <a:srgbClr val="000000"/>
                   </a:solidFill>
@@ -2106,7 +2104,7 @@
             </a:ln>
             <a:extLst>
               <a:ext uri="{91240B29-F687-4f45-9708-019B960494DF}">
-                <a14:hiddenLine xmlns:a14="http://schemas.microsoft.com/office/drawing/2010/main" xmlns="" w="9525">
+                <a14:hiddenLine xmlns="" xmlns:a14="http://schemas.microsoft.com/office/drawing/2010/main" w="9525">
                   <a:solidFill>
                     <a:srgbClr val="000000"/>
                   </a:solidFill>
@@ -2168,7 +2166,7 @@
             </a:ln>
             <a:extLst>
               <a:ext uri="{91240B29-F687-4f45-9708-019B960494DF}">
-                <a14:hiddenLine xmlns:a14="http://schemas.microsoft.com/office/drawing/2010/main" xmlns="" w="9525">
+                <a14:hiddenLine xmlns="" xmlns:a14="http://schemas.microsoft.com/office/drawing/2010/main" w="9525">
                   <a:solidFill>
                     <a:srgbClr val="000000"/>
                   </a:solidFill>
@@ -2258,7 +2256,7 @@
             </a:ln>
             <a:extLst>
               <a:ext uri="{91240B29-F687-4f45-9708-019B960494DF}">
-                <a14:hiddenLine xmlns:a14="http://schemas.microsoft.com/office/drawing/2010/main" xmlns="" w="9525">
+                <a14:hiddenLine xmlns="" xmlns:a14="http://schemas.microsoft.com/office/drawing/2010/main" w="9525">
                   <a:solidFill>
                     <a:srgbClr val="000000"/>
                   </a:solidFill>
@@ -2348,7 +2346,7 @@
             </a:ln>
             <a:extLst>
               <a:ext uri="{91240B29-F687-4f45-9708-019B960494DF}">
-                <a14:hiddenLine xmlns:a14="http://schemas.microsoft.com/office/drawing/2010/main" xmlns="" w="9525">
+                <a14:hiddenLine xmlns="" xmlns:a14="http://schemas.microsoft.com/office/drawing/2010/main" w="9525">
                   <a:solidFill>
                     <a:srgbClr val="000000"/>
                   </a:solidFill>
@@ -2410,7 +2408,7 @@
             </a:ln>
             <a:extLst>
               <a:ext uri="{91240B29-F687-4f45-9708-019B960494DF}">
-                <a14:hiddenLine xmlns:a14="http://schemas.microsoft.com/office/drawing/2010/main" xmlns="" w="9525">
+                <a14:hiddenLine xmlns="" xmlns:a14="http://schemas.microsoft.com/office/drawing/2010/main" w="9525">
                   <a:solidFill>
                     <a:srgbClr val="000000"/>
                   </a:solidFill>
@@ -2500,7 +2498,7 @@
             </a:ln>
             <a:extLst>
               <a:ext uri="{91240B29-F687-4f45-9708-019B960494DF}">
-                <a14:hiddenLine xmlns:a14="http://schemas.microsoft.com/office/drawing/2010/main" xmlns="" w="9525">
+                <a14:hiddenLine xmlns="" xmlns:a14="http://schemas.microsoft.com/office/drawing/2010/main" w="9525">
                   <a:solidFill>
                     <a:srgbClr val="000000"/>
                   </a:solidFill>
@@ -2590,7 +2588,7 @@
             </a:ln>
             <a:extLst>
               <a:ext uri="{91240B29-F687-4f45-9708-019B960494DF}">
-                <a14:hiddenLine xmlns:a14="http://schemas.microsoft.com/office/drawing/2010/main" xmlns="" w="9525">
+                <a14:hiddenLine xmlns="" xmlns:a14="http://schemas.microsoft.com/office/drawing/2010/main" w="9525">
                   <a:solidFill>
                     <a:srgbClr val="000000"/>
                   </a:solidFill>
@@ -2646,7 +2644,7 @@
             </a:ln>
             <a:extLst>
               <a:ext uri="{91240B29-F687-4f45-9708-019B960494DF}">
-                <a14:hiddenLine xmlns:a14="http://schemas.microsoft.com/office/drawing/2010/main" xmlns="" w="9525">
+                <a14:hiddenLine xmlns="" xmlns:a14="http://schemas.microsoft.com/office/drawing/2010/main" w="9525">
                   <a:solidFill>
                     <a:srgbClr val="000000"/>
                   </a:solidFill>
@@ -2736,7 +2734,7 @@
             </a:ln>
             <a:extLst>
               <a:ext uri="{91240B29-F687-4f45-9708-019B960494DF}">
-                <a14:hiddenLine xmlns:a14="http://schemas.microsoft.com/office/drawing/2010/main" xmlns="" w="9525">
+                <a14:hiddenLine xmlns="" xmlns:a14="http://schemas.microsoft.com/office/drawing/2010/main" w="9525">
                   <a:solidFill>
                     <a:srgbClr val="000000"/>
                   </a:solidFill>
@@ -2792,7 +2790,7 @@
             </a:ln>
             <a:extLst>
               <a:ext uri="{91240B29-F687-4f45-9708-019B960494DF}">
-                <a14:hiddenLine xmlns:a14="http://schemas.microsoft.com/office/drawing/2010/main" xmlns="" w="9525">
+                <a14:hiddenLine xmlns="" xmlns:a14="http://schemas.microsoft.com/office/drawing/2010/main" w="9525">
                   <a:solidFill>
                     <a:srgbClr val="000000"/>
                   </a:solidFill>
@@ -2882,7 +2880,7 @@
             </a:ln>
             <a:extLst>
               <a:ext uri="{91240B29-F687-4f45-9708-019B960494DF}">
-                <a14:hiddenLine xmlns:a14="http://schemas.microsoft.com/office/drawing/2010/main" xmlns="" w="9525">
+                <a14:hiddenLine xmlns="" xmlns:a14="http://schemas.microsoft.com/office/drawing/2010/main" w="9525">
                   <a:solidFill>
                     <a:srgbClr val="000000"/>
                   </a:solidFill>
@@ -2950,7 +2948,7 @@
             </a:ln>
             <a:extLst>
               <a:ext uri="{91240B29-F687-4f45-9708-019B960494DF}">
-                <a14:hiddenLine xmlns:a14="http://schemas.microsoft.com/office/drawing/2010/main" xmlns="" w="9525">
+                <a14:hiddenLine xmlns="" xmlns:a14="http://schemas.microsoft.com/office/drawing/2010/main" w="9525">
                   <a:solidFill>
                     <a:srgbClr val="000000"/>
                   </a:solidFill>
@@ -3040,7 +3038,7 @@
             </a:ln>
             <a:extLst>
               <a:ext uri="{91240B29-F687-4f45-9708-019B960494DF}">
-                <a14:hiddenLine xmlns:a14="http://schemas.microsoft.com/office/drawing/2010/main" xmlns="" w="9525">
+                <a14:hiddenLine xmlns="" xmlns:a14="http://schemas.microsoft.com/office/drawing/2010/main" w="9525">
                   <a:solidFill>
                     <a:srgbClr val="000000"/>
                   </a:solidFill>
@@ -3108,7 +3106,7 @@
             </a:ln>
             <a:extLst>
               <a:ext uri="{91240B29-F687-4f45-9708-019B960494DF}">
-                <a14:hiddenLine xmlns:a14="http://schemas.microsoft.com/office/drawing/2010/main" xmlns="" w="9525">
+                <a14:hiddenLine xmlns="" xmlns:a14="http://schemas.microsoft.com/office/drawing/2010/main" w="9525">
                   <a:solidFill>
                     <a:srgbClr val="000000"/>
                   </a:solidFill>
@@ -3198,7 +3196,7 @@
             </a:ln>
             <a:extLst>
               <a:ext uri="{91240B29-F687-4f45-9708-019B960494DF}">
-                <a14:hiddenLine xmlns:a14="http://schemas.microsoft.com/office/drawing/2010/main" xmlns="" w="9525">
+                <a14:hiddenLine xmlns="" xmlns:a14="http://schemas.microsoft.com/office/drawing/2010/main" w="9525">
                   <a:solidFill>
                     <a:srgbClr val="000000"/>
                   </a:solidFill>
@@ -3232,7 +3230,7 @@
             </a:ln>
             <a:extLst>
               <a:ext uri="{91240B29-F687-4f45-9708-019B960494DF}">
-                <a14:hiddenLine xmlns:a14="http://schemas.microsoft.com/office/drawing/2010/main" xmlns="" w="9525">
+                <a14:hiddenLine xmlns="" xmlns:a14="http://schemas.microsoft.com/office/drawing/2010/main" w="9525">
                   <a:solidFill>
                     <a:srgbClr val="000000"/>
                   </a:solidFill>
@@ -3322,7 +3320,7 @@
             </a:ln>
             <a:extLst>
               <a:ext uri="{91240B29-F687-4f45-9708-019B960494DF}">
-                <a14:hiddenLine xmlns:a14="http://schemas.microsoft.com/office/drawing/2010/main" xmlns="" w="9525">
+                <a14:hiddenLine xmlns="" xmlns:a14="http://schemas.microsoft.com/office/drawing/2010/main" w="9525">
                   <a:solidFill>
                     <a:srgbClr val="000000"/>
                   </a:solidFill>
@@ -3384,7 +3382,7 @@
             </a:ln>
             <a:extLst>
               <a:ext uri="{91240B29-F687-4f45-9708-019B960494DF}">
-                <a14:hiddenLine xmlns:a14="http://schemas.microsoft.com/office/drawing/2010/main" xmlns="" w="9525">
+                <a14:hiddenLine xmlns="" xmlns:a14="http://schemas.microsoft.com/office/drawing/2010/main" w="9525">
                   <a:solidFill>
                     <a:srgbClr val="000000"/>
                   </a:solidFill>
@@ -3446,7 +3444,7 @@
             </a:ln>
             <a:extLst>
               <a:ext uri="{91240B29-F687-4f45-9708-019B960494DF}">
-                <a14:hiddenLine xmlns:a14="http://schemas.microsoft.com/office/drawing/2010/main" xmlns="" w="9525">
+                <a14:hiddenLine xmlns="" xmlns:a14="http://schemas.microsoft.com/office/drawing/2010/main" w="9525">
                   <a:solidFill>
                     <a:srgbClr val="000000"/>
                   </a:solidFill>
@@ -3536,7 +3534,7 @@
             </a:ln>
             <a:extLst>
               <a:ext uri="{91240B29-F687-4f45-9708-019B960494DF}">
-                <a14:hiddenLine xmlns:a14="http://schemas.microsoft.com/office/drawing/2010/main" xmlns="" w="9525">
+                <a14:hiddenLine xmlns="" xmlns:a14="http://schemas.microsoft.com/office/drawing/2010/main" w="9525">
                   <a:solidFill>
                     <a:srgbClr val="000000"/>
                   </a:solidFill>
@@ -3604,7 +3602,7 @@
             </a:ln>
             <a:extLst>
               <a:ext uri="{91240B29-F687-4f45-9708-019B960494DF}">
-                <a14:hiddenLine xmlns:a14="http://schemas.microsoft.com/office/drawing/2010/main" xmlns="" w="9525">
+                <a14:hiddenLine xmlns="" xmlns:a14="http://schemas.microsoft.com/office/drawing/2010/main" w="9525">
                   <a:solidFill>
                     <a:srgbClr val="000000"/>
                   </a:solidFill>
@@ -3666,7 +3664,7 @@
             </a:ln>
             <a:extLst>
               <a:ext uri="{91240B29-F687-4f45-9708-019B960494DF}">
-                <a14:hiddenLine xmlns:a14="http://schemas.microsoft.com/office/drawing/2010/main" xmlns="" w="9525">
+                <a14:hiddenLine xmlns="" xmlns:a14="http://schemas.microsoft.com/office/drawing/2010/main" w="9525">
                   <a:solidFill>
                     <a:srgbClr val="000000"/>
                   </a:solidFill>
@@ -3756,7 +3754,7 @@
             </a:ln>
             <a:extLst>
               <a:ext uri="{91240B29-F687-4f45-9708-019B960494DF}">
-                <a14:hiddenLine xmlns:a14="http://schemas.microsoft.com/office/drawing/2010/main" xmlns="" w="9525">
+                <a14:hiddenLine xmlns="" xmlns:a14="http://schemas.microsoft.com/office/drawing/2010/main" w="9525">
                   <a:solidFill>
                     <a:srgbClr val="000000"/>
                   </a:solidFill>
@@ -3818,7 +3816,7 @@
             </a:ln>
             <a:extLst>
               <a:ext uri="{91240B29-F687-4f45-9708-019B960494DF}">
-                <a14:hiddenLine xmlns:a14="http://schemas.microsoft.com/office/drawing/2010/main" xmlns="" w="9525">
+                <a14:hiddenLine xmlns="" xmlns:a14="http://schemas.microsoft.com/office/drawing/2010/main" w="9525">
                   <a:solidFill>
                     <a:srgbClr val="000000"/>
                   </a:solidFill>
@@ -3908,7 +3906,7 @@
             </a:ln>
             <a:extLst>
               <a:ext uri="{91240B29-F687-4f45-9708-019B960494DF}">
-                <a14:hiddenLine xmlns:a14="http://schemas.microsoft.com/office/drawing/2010/main" xmlns="" w="9525">
+                <a14:hiddenLine xmlns="" xmlns:a14="http://schemas.microsoft.com/office/drawing/2010/main" w="9525">
                   <a:solidFill>
                     <a:srgbClr val="000000"/>
                   </a:solidFill>
@@ -3970,7 +3968,7 @@
             </a:ln>
             <a:extLst>
               <a:ext uri="{91240B29-F687-4f45-9708-019B960494DF}">
-                <a14:hiddenLine xmlns:a14="http://schemas.microsoft.com/office/drawing/2010/main" xmlns="" w="9525">
+                <a14:hiddenLine xmlns="" xmlns:a14="http://schemas.microsoft.com/office/drawing/2010/main" w="9525">
                   <a:solidFill>
                     <a:srgbClr val="000000"/>
                   </a:solidFill>
@@ -4060,7 +4058,7 @@
             </a:ln>
             <a:extLst>
               <a:ext uri="{91240B29-F687-4f45-9708-019B960494DF}">
-                <a14:hiddenLine xmlns:a14="http://schemas.microsoft.com/office/drawing/2010/main" xmlns="" w="9525">
+                <a14:hiddenLine xmlns="" xmlns:a14="http://schemas.microsoft.com/office/drawing/2010/main" w="9525">
                   <a:solidFill>
                     <a:srgbClr val="000000"/>
                   </a:solidFill>
@@ -4094,7 +4092,7 @@
             </a:ln>
             <a:extLst>
               <a:ext uri="{91240B29-F687-4f45-9708-019B960494DF}">
-                <a14:hiddenLine xmlns:a14="http://schemas.microsoft.com/office/drawing/2010/main" xmlns="" w="9525">
+                <a14:hiddenLine xmlns="" xmlns:a14="http://schemas.microsoft.com/office/drawing/2010/main" w="9525">
                   <a:solidFill>
                     <a:srgbClr val="000000"/>
                   </a:solidFill>
@@ -4159,7 +4157,7 @@
             </a:ln>
             <a:extLst>
               <a:ext uri="{91240B29-F687-4f45-9708-019B960494DF}">
-                <a14:hiddenLine xmlns:a14="http://schemas.microsoft.com/office/drawing/2010/main" xmlns="" w="9525">
+                <a14:hiddenLine xmlns="" xmlns:a14="http://schemas.microsoft.com/office/drawing/2010/main" w="9525">
                   <a:solidFill>
                     <a:srgbClr val="000000"/>
                   </a:solidFill>
@@ -4249,7 +4247,7 @@
             </a:ln>
             <a:extLst>
               <a:ext uri="{91240B29-F687-4f45-9708-019B960494DF}">
-                <a14:hiddenLine xmlns:a14="http://schemas.microsoft.com/office/drawing/2010/main" xmlns="" w="9525">
+                <a14:hiddenLine xmlns="" xmlns:a14="http://schemas.microsoft.com/office/drawing/2010/main" w="9525">
                   <a:solidFill>
                     <a:srgbClr val="000000"/>
                   </a:solidFill>
@@ -4311,7 +4309,7 @@
             </a:ln>
             <a:extLst>
               <a:ext uri="{91240B29-F687-4f45-9708-019B960494DF}">
-                <a14:hiddenLine xmlns:a14="http://schemas.microsoft.com/office/drawing/2010/main" xmlns="" w="9525">
+                <a14:hiddenLine xmlns="" xmlns:a14="http://schemas.microsoft.com/office/drawing/2010/main" w="9525">
                   <a:solidFill>
                     <a:srgbClr val="000000"/>
                   </a:solidFill>
@@ -4401,7 +4399,7 @@
             </a:ln>
             <a:extLst>
               <a:ext uri="{91240B29-F687-4f45-9708-019B960494DF}">
-                <a14:hiddenLine xmlns:a14="http://schemas.microsoft.com/office/drawing/2010/main" xmlns="" w="9525">
+                <a14:hiddenLine xmlns="" xmlns:a14="http://schemas.microsoft.com/office/drawing/2010/main" w="9525">
                   <a:solidFill>
                     <a:srgbClr val="000000"/>
                   </a:solidFill>
@@ -4491,7 +4489,7 @@
             </a:ln>
             <a:extLst>
               <a:ext uri="{91240B29-F687-4f45-9708-019B960494DF}">
-                <a14:hiddenLine xmlns:a14="http://schemas.microsoft.com/office/drawing/2010/main" xmlns="" w="9525">
+                <a14:hiddenLine xmlns="" xmlns:a14="http://schemas.microsoft.com/office/drawing/2010/main" w="9525">
                   <a:solidFill>
                     <a:srgbClr val="000000"/>
                   </a:solidFill>
@@ -4556,7 +4554,7 @@
             </a:ln>
             <a:extLst>
               <a:ext uri="{91240B29-F687-4f45-9708-019B960494DF}">
-                <a14:hiddenLine xmlns:a14="http://schemas.microsoft.com/office/drawing/2010/main" xmlns="" w="9525">
+                <a14:hiddenLine xmlns="" xmlns:a14="http://schemas.microsoft.com/office/drawing/2010/main" w="9525">
                   <a:solidFill>
                     <a:srgbClr val="000000"/>
                   </a:solidFill>
@@ -4618,7 +4616,7 @@
             </a:ln>
             <a:extLst>
               <a:ext uri="{91240B29-F687-4f45-9708-019B960494DF}">
-                <a14:hiddenLine xmlns:a14="http://schemas.microsoft.com/office/drawing/2010/main" xmlns="" w="9525">
+                <a14:hiddenLine xmlns="" xmlns:a14="http://schemas.microsoft.com/office/drawing/2010/main" w="9525">
                   <a:solidFill>
                     <a:srgbClr val="000000"/>
                   </a:solidFill>
@@ -4708,7 +4706,7 @@
             </a:ln>
             <a:extLst>
               <a:ext uri="{91240B29-F687-4f45-9708-019B960494DF}">
-                <a14:hiddenLine xmlns:a14="http://schemas.microsoft.com/office/drawing/2010/main" xmlns="" w="9525">
+                <a14:hiddenLine xmlns="" xmlns:a14="http://schemas.microsoft.com/office/drawing/2010/main" w="9525">
                   <a:solidFill>
                     <a:srgbClr val="000000"/>
                   </a:solidFill>
@@ -4798,7 +4796,7 @@
             </a:ln>
             <a:extLst>
               <a:ext uri="{91240B29-F687-4f45-9708-019B960494DF}">
-                <a14:hiddenLine xmlns:a14="http://schemas.microsoft.com/office/drawing/2010/main" xmlns="" w="9525">
+                <a14:hiddenLine xmlns="" xmlns:a14="http://schemas.microsoft.com/office/drawing/2010/main" w="9525">
                   <a:solidFill>
                     <a:srgbClr val="000000"/>
                   </a:solidFill>
@@ -4860,7 +4858,7 @@
             </a:ln>
             <a:extLst>
               <a:ext uri="{91240B29-F687-4f45-9708-019B960494DF}">
-                <a14:hiddenLine xmlns:a14="http://schemas.microsoft.com/office/drawing/2010/main" xmlns="" w="9525">
+                <a14:hiddenLine xmlns="" xmlns:a14="http://schemas.microsoft.com/office/drawing/2010/main" w="9525">
                   <a:solidFill>
                     <a:srgbClr val="000000"/>
                   </a:solidFill>
@@ -4980,7 +4978,7 @@
             </a:ln>
             <a:extLst>
               <a:ext uri="{91240B29-F687-4f45-9708-019B960494DF}">
-                <a14:hiddenLine xmlns:a14="http://schemas.microsoft.com/office/drawing/2010/main" xmlns="" w="9525">
+                <a14:hiddenLine xmlns="" xmlns:a14="http://schemas.microsoft.com/office/drawing/2010/main" w="9525">
                   <a:solidFill>
                     <a:srgbClr val="000000"/>
                   </a:solidFill>
@@ -5048,7 +5046,7 @@
             </a:ln>
             <a:extLst>
               <a:ext uri="{91240B29-F687-4f45-9708-019B960494DF}">
-                <a14:hiddenLine xmlns:a14="http://schemas.microsoft.com/office/drawing/2010/main" xmlns="" w="9525">
+                <a14:hiddenLine xmlns="" xmlns:a14="http://schemas.microsoft.com/office/drawing/2010/main" w="9525">
                   <a:solidFill>
                     <a:srgbClr val="000000"/>
                   </a:solidFill>
@@ -5138,7 +5136,7 @@
             </a:ln>
             <a:extLst>
               <a:ext uri="{91240B29-F687-4f45-9708-019B960494DF}">
-                <a14:hiddenLine xmlns:a14="http://schemas.microsoft.com/office/drawing/2010/main" xmlns="" w="9525">
+                <a14:hiddenLine xmlns="" xmlns:a14="http://schemas.microsoft.com/office/drawing/2010/main" w="9525">
                   <a:solidFill>
                     <a:srgbClr val="000000"/>
                   </a:solidFill>
@@ -5278,7 +5276,7 @@
           <a:p>
             <a:fld id="{D8087129-5EB3-407F-9D58-12B58254E57D}" type="datetime1">
               <a:rPr lang="en-US" smtClean="0"/>
-              <a:t>1/23/2017</a:t>
+              <a:t>2/8/2017</a:t>
             </a:fld>
             <a:endParaRPr lang="en-US" dirty="0"/>
           </a:p>
@@ -5544,7 +5542,7 @@
           <a:p>
             <a:fld id="{D3E4790F-9337-4CDC-8D14-B06CCEB6C73C}" type="datetime1">
               <a:rPr lang="en-US" smtClean="0"/>
-              <a:t>1/23/2017</a:t>
+              <a:t>2/8/2017</a:t>
             </a:fld>
             <a:endParaRPr lang="en-US" dirty="0"/>
           </a:p>
@@ -5739,7 +5737,7 @@
           <a:p>
             <a:fld id="{9B0760F9-7BA8-4EC7-8BDB-5C223A9F1787}" type="datetime1">
               <a:rPr lang="en-US" smtClean="0"/>
-              <a:t>1/23/2017</a:t>
+              <a:t>2/8/2017</a:t>
             </a:fld>
             <a:endParaRPr lang="en-US" dirty="0"/>
           </a:p>
@@ -6001,7 +5999,7 @@
           <a:p>
             <a:fld id="{A03E3F31-3630-4F25-9FD3-9398F0ABBE91}" type="datetime1">
               <a:rPr lang="en-US" smtClean="0"/>
-              <a:t>1/23/2017</a:t>
+              <a:t>2/8/2017</a:t>
             </a:fld>
             <a:endParaRPr lang="en-US" dirty="0"/>
           </a:p>
@@ -6434,7 +6432,7 @@
           <a:p>
             <a:fld id="{A66298DF-41F0-4FCA-8F78-168349C886A1}" type="datetime1">
               <a:rPr lang="en-US" smtClean="0"/>
-              <a:t>1/23/2017</a:t>
+              <a:t>2/8/2017</a:t>
             </a:fld>
             <a:endParaRPr lang="en-US" dirty="0"/>
           </a:p>
@@ -6979,7 +6977,7 @@
           <a:p>
             <a:fld id="{E78E2497-700C-4D1C-8F0E-0217BC78D22A}" type="datetime1">
               <a:rPr lang="en-US" smtClean="0"/>
-              <a:t>1/23/2017</a:t>
+              <a:t>2/8/2017</a:t>
             </a:fld>
             <a:endParaRPr lang="en-US" dirty="0"/>
           </a:p>
@@ -7698,7 +7696,7 @@
           <a:p>
             <a:fld id="{11B0A668-7952-4E05-A29E-3CAE9E4C88B3}" type="datetime1">
               <a:rPr lang="en-US" smtClean="0"/>
-              <a:t>1/23/2017</a:t>
+              <a:t>2/8/2017</a:t>
             </a:fld>
             <a:endParaRPr lang="en-US" dirty="0"/>
           </a:p>
@@ -7867,7 +7865,7 @@
           <a:p>
             <a:fld id="{51572ADD-8853-4F9B-BE74-04D3631B0AE8}" type="datetime1">
               <a:rPr lang="en-US" smtClean="0"/>
-              <a:t>1/23/2017</a:t>
+              <a:t>2/8/2017</a:t>
             </a:fld>
             <a:endParaRPr lang="en-US" dirty="0"/>
           </a:p>
@@ -8046,7 +8044,7 @@
           <a:p>
             <a:fld id="{F4AE7FAB-9C63-45B1-B528-0E08F0958326}" type="datetime1">
               <a:rPr lang="en-US" smtClean="0"/>
-              <a:t>1/23/2017</a:t>
+              <a:t>2/8/2017</a:t>
             </a:fld>
             <a:endParaRPr lang="en-US" dirty="0"/>
           </a:p>
@@ -8215,7 +8213,7 @@
           <a:p>
             <a:fld id="{789D286F-1FB1-4449-8266-6E87DF39D004}" type="datetime1">
               <a:rPr lang="en-US" smtClean="0"/>
-              <a:t>1/23/2017</a:t>
+              <a:t>2/8/2017</a:t>
             </a:fld>
             <a:endParaRPr lang="en-US" dirty="0"/>
           </a:p>
@@ -8464,7 +8462,7 @@
           <a:p>
             <a:fld id="{71778EDE-CE0C-4BA8-BD03-52FA661B2ABD}" type="datetime1">
               <a:rPr lang="en-US" smtClean="0"/>
-              <a:t>1/23/2017</a:t>
+              <a:t>2/8/2017</a:t>
             </a:fld>
             <a:endParaRPr lang="en-US" dirty="0"/>
           </a:p>
@@ -8695,7 +8693,7 @@
           <a:p>
             <a:fld id="{88B2015C-2313-4FA0-967E-15787170F8A4}" type="datetime1">
               <a:rPr lang="en-US" smtClean="0"/>
-              <a:t>1/23/2017</a:t>
+              <a:t>2/8/2017</a:t>
             </a:fld>
             <a:endParaRPr lang="en-US" dirty="0"/>
           </a:p>
@@ -9075,7 +9073,7 @@
           <a:p>
             <a:fld id="{337E4337-038C-466F-9539-3AC9182A3E7A}" type="datetime1">
               <a:rPr lang="en-US" smtClean="0"/>
-              <a:t>1/23/2017</a:t>
+              <a:t>2/8/2017</a:t>
             </a:fld>
             <a:endParaRPr lang="en-US" dirty="0"/>
           </a:p>
@@ -9192,7 +9190,7 @@
           <a:p>
             <a:fld id="{8AD42594-B169-4822-92C9-42932B767ACF}" type="datetime1">
               <a:rPr lang="en-US" smtClean="0"/>
-              <a:t>1/23/2017</a:t>
+              <a:t>2/8/2017</a:t>
             </a:fld>
             <a:endParaRPr lang="en-US" dirty="0"/>
           </a:p>
@@ -9286,7 +9284,7 @@
           <a:p>
             <a:fld id="{F960638A-EF8D-4E59-9B91-E876A1027CEA}" type="datetime1">
               <a:rPr lang="en-US" smtClean="0"/>
-              <a:t>1/23/2017</a:t>
+              <a:t>2/8/2017</a:t>
             </a:fld>
             <a:endParaRPr lang="en-US" dirty="0"/>
           </a:p>
@@ -9534,7 +9532,7 @@
           <a:p>
             <a:fld id="{77094E32-9543-411B-B3AF-87FC3BF95F14}" type="datetime1">
               <a:rPr lang="en-US" smtClean="0"/>
-              <a:t>1/23/2017</a:t>
+              <a:t>2/8/2017</a:t>
             </a:fld>
             <a:endParaRPr lang="en-US" dirty="0"/>
           </a:p>
@@ -9813,7 +9811,7 @@
           <a:p>
             <a:fld id="{6ADE433C-70DD-4676-82F0-30FDB4061909}" type="datetime1">
               <a:rPr lang="en-US" smtClean="0"/>
-              <a:t>1/23/2017</a:t>
+              <a:t>2/8/2017</a:t>
             </a:fld>
             <a:endParaRPr lang="en-US" dirty="0"/>
           </a:p>
@@ -9928,7 +9926,7 @@
           <a:noFill/>
           <a:extLst>
             <a:ext uri="{909E8E84-426E-40dd-AFC4-6F175D3DCCD1}">
-              <a14:hiddenFill xmlns:a14="http://schemas.microsoft.com/office/drawing/2010/main" xmlns="">
+              <a14:hiddenFill xmlns="" xmlns:a14="http://schemas.microsoft.com/office/drawing/2010/main">
                 <a:solidFill>
                   <a:srgbClr val="FFFFFF"/>
                 </a:solidFill>
@@ -10002,7 +10000,7 @@
               </a:ln>
               <a:extLst>
                 <a:ext uri="{91240B29-F687-4f45-9708-019B960494DF}">
-                  <a14:hiddenLine xmlns:a14="http://schemas.microsoft.com/office/drawing/2010/main" xmlns="" w="9525">
+                  <a14:hiddenLine xmlns="" xmlns:a14="http://schemas.microsoft.com/office/drawing/2010/main" w="9525">
                     <a:solidFill>
                       <a:srgbClr val="000000"/>
                     </a:solidFill>
@@ -10092,7 +10090,7 @@
               </a:ln>
               <a:extLst>
                 <a:ext uri="{91240B29-F687-4f45-9708-019B960494DF}">
-                  <a14:hiddenLine xmlns:a14="http://schemas.microsoft.com/office/drawing/2010/main" xmlns="" w="9525">
+                  <a14:hiddenLine xmlns="" xmlns:a14="http://schemas.microsoft.com/office/drawing/2010/main" w="9525">
                     <a:solidFill>
                       <a:srgbClr val="000000"/>
                     </a:solidFill>
@@ -10182,7 +10180,7 @@
               </a:ln>
               <a:extLst>
                 <a:ext uri="{91240B29-F687-4f45-9708-019B960494DF}">
-                  <a14:hiddenLine xmlns:a14="http://schemas.microsoft.com/office/drawing/2010/main" xmlns="" w="9525">
+                  <a14:hiddenLine xmlns="" xmlns:a14="http://schemas.microsoft.com/office/drawing/2010/main" w="9525">
                     <a:solidFill>
                       <a:srgbClr val="000000"/>
                     </a:solidFill>
@@ -10244,7 +10242,7 @@
               </a:ln>
               <a:extLst>
                 <a:ext uri="{91240B29-F687-4f45-9708-019B960494DF}">
-                  <a14:hiddenLine xmlns:a14="http://schemas.microsoft.com/office/drawing/2010/main" xmlns="" w="9525">
+                  <a14:hiddenLine xmlns="" xmlns:a14="http://schemas.microsoft.com/office/drawing/2010/main" w="9525">
                     <a:solidFill>
                       <a:srgbClr val="000000"/>
                     </a:solidFill>
@@ -10334,7 +10332,7 @@
               </a:ln>
               <a:extLst>
                 <a:ext uri="{91240B29-F687-4f45-9708-019B960494DF}">
-                  <a14:hiddenLine xmlns:a14="http://schemas.microsoft.com/office/drawing/2010/main" xmlns="" w="9525">
+                  <a14:hiddenLine xmlns="" xmlns:a14="http://schemas.microsoft.com/office/drawing/2010/main" w="9525">
                     <a:solidFill>
                       <a:srgbClr val="000000"/>
                     </a:solidFill>
@@ -10396,7 +10394,7 @@
               </a:ln>
               <a:extLst>
                 <a:ext uri="{91240B29-F687-4f45-9708-019B960494DF}">
-                  <a14:hiddenLine xmlns:a14="http://schemas.microsoft.com/office/drawing/2010/main" xmlns="" w="9525">
+                  <a14:hiddenLine xmlns="" xmlns:a14="http://schemas.microsoft.com/office/drawing/2010/main" w="9525">
                     <a:solidFill>
                       <a:srgbClr val="000000"/>
                     </a:solidFill>
@@ -10458,7 +10456,7 @@
               </a:ln>
               <a:extLst>
                 <a:ext uri="{91240B29-F687-4f45-9708-019B960494DF}">
-                  <a14:hiddenLine xmlns:a14="http://schemas.microsoft.com/office/drawing/2010/main" xmlns="" w="9525">
+                  <a14:hiddenLine xmlns="" xmlns:a14="http://schemas.microsoft.com/office/drawing/2010/main" w="9525">
                     <a:solidFill>
                       <a:srgbClr val="000000"/>
                     </a:solidFill>
@@ -10548,7 +10546,7 @@
               </a:ln>
               <a:extLst>
                 <a:ext uri="{91240B29-F687-4f45-9708-019B960494DF}">
-                  <a14:hiddenLine xmlns:a14="http://schemas.microsoft.com/office/drawing/2010/main" xmlns="" w="9525">
+                  <a14:hiddenLine xmlns="" xmlns:a14="http://schemas.microsoft.com/office/drawing/2010/main" w="9525">
                     <a:solidFill>
                       <a:srgbClr val="000000"/>
                     </a:solidFill>
@@ -10638,7 +10636,7 @@
               </a:ln>
               <a:extLst>
                 <a:ext uri="{91240B29-F687-4f45-9708-019B960494DF}">
-                  <a14:hiddenLine xmlns:a14="http://schemas.microsoft.com/office/drawing/2010/main" xmlns="" w="9525">
+                  <a14:hiddenLine xmlns="" xmlns:a14="http://schemas.microsoft.com/office/drawing/2010/main" w="9525">
                     <a:solidFill>
                       <a:srgbClr val="000000"/>
                     </a:solidFill>
@@ -10700,7 +10698,7 @@
               </a:ln>
               <a:extLst>
                 <a:ext uri="{91240B29-F687-4f45-9708-019B960494DF}">
-                  <a14:hiddenLine xmlns:a14="http://schemas.microsoft.com/office/drawing/2010/main" xmlns="" w="9525">
+                  <a14:hiddenLine xmlns="" xmlns:a14="http://schemas.microsoft.com/office/drawing/2010/main" w="9525">
                     <a:solidFill>
                       <a:srgbClr val="000000"/>
                     </a:solidFill>
@@ -10810,7 +10808,7 @@
               </a:ln>
               <a:extLst>
                 <a:ext uri="{91240B29-F687-4f45-9708-019B960494DF}">
-                  <a14:hiddenLine xmlns:a14="http://schemas.microsoft.com/office/drawing/2010/main" xmlns="" w="9525">
+                  <a14:hiddenLine xmlns="" xmlns:a14="http://schemas.microsoft.com/office/drawing/2010/main" w="9525">
                     <a:solidFill>
                       <a:srgbClr val="000000"/>
                     </a:solidFill>
@@ -10894,7 +10892,7 @@
               </a:ln>
               <a:extLst>
                 <a:ext uri="{91240B29-F687-4f45-9708-019B960494DF}">
-                  <a14:hiddenLine xmlns:a14="http://schemas.microsoft.com/office/drawing/2010/main" xmlns="" w="9525">
+                  <a14:hiddenLine xmlns="" xmlns:a14="http://schemas.microsoft.com/office/drawing/2010/main" w="9525">
                     <a:solidFill>
                       <a:srgbClr val="000000"/>
                     </a:solidFill>
@@ -10956,7 +10954,7 @@
               </a:ln>
               <a:extLst>
                 <a:ext uri="{91240B29-F687-4f45-9708-019B960494DF}">
-                  <a14:hiddenLine xmlns:a14="http://schemas.microsoft.com/office/drawing/2010/main" xmlns="" w="9525">
+                  <a14:hiddenLine xmlns="" xmlns:a14="http://schemas.microsoft.com/office/drawing/2010/main" w="9525">
                     <a:solidFill>
                       <a:srgbClr val="000000"/>
                     </a:solidFill>
@@ -11018,7 +11016,7 @@
               </a:ln>
               <a:extLst>
                 <a:ext uri="{91240B29-F687-4f45-9708-019B960494DF}">
-                  <a14:hiddenLine xmlns:a14="http://schemas.microsoft.com/office/drawing/2010/main" xmlns="" w="9525">
+                  <a14:hiddenLine xmlns="" xmlns:a14="http://schemas.microsoft.com/office/drawing/2010/main" w="9525">
                     <a:solidFill>
                       <a:srgbClr val="000000"/>
                     </a:solidFill>
@@ -11108,7 +11106,7 @@
               </a:ln>
               <a:extLst>
                 <a:ext uri="{91240B29-F687-4f45-9708-019B960494DF}">
-                  <a14:hiddenLine xmlns:a14="http://schemas.microsoft.com/office/drawing/2010/main" xmlns="" w="9525">
+                  <a14:hiddenLine xmlns="" xmlns:a14="http://schemas.microsoft.com/office/drawing/2010/main" w="9525">
                     <a:solidFill>
                       <a:srgbClr val="000000"/>
                     </a:solidFill>
@@ -11142,7 +11140,7 @@
               </a:ln>
               <a:extLst>
                 <a:ext uri="{91240B29-F687-4f45-9708-019B960494DF}">
-                  <a14:hiddenLine xmlns:a14="http://schemas.microsoft.com/office/drawing/2010/main" xmlns="" w="9525">
+                  <a14:hiddenLine xmlns="" xmlns:a14="http://schemas.microsoft.com/office/drawing/2010/main" w="9525">
                     <a:solidFill>
                       <a:srgbClr val="000000"/>
                     </a:solidFill>
@@ -11207,7 +11205,7 @@
               </a:ln>
               <a:extLst>
                 <a:ext uri="{91240B29-F687-4f45-9708-019B960494DF}">
-                  <a14:hiddenLine xmlns:a14="http://schemas.microsoft.com/office/drawing/2010/main" xmlns="" w="9525">
+                  <a14:hiddenLine xmlns="" xmlns:a14="http://schemas.microsoft.com/office/drawing/2010/main" w="9525">
                     <a:solidFill>
                       <a:srgbClr val="000000"/>
                     </a:solidFill>
@@ -11297,7 +11295,7 @@
               </a:ln>
               <a:extLst>
                 <a:ext uri="{91240B29-F687-4f45-9708-019B960494DF}">
-                  <a14:hiddenLine xmlns:a14="http://schemas.microsoft.com/office/drawing/2010/main" xmlns="" w="9525">
+                  <a14:hiddenLine xmlns="" xmlns:a14="http://schemas.microsoft.com/office/drawing/2010/main" w="9525">
                     <a:solidFill>
                       <a:srgbClr val="000000"/>
                     </a:solidFill>
@@ -11359,7 +11357,7 @@
               </a:ln>
               <a:extLst>
                 <a:ext uri="{91240B29-F687-4f45-9708-019B960494DF}">
-                  <a14:hiddenLine xmlns:a14="http://schemas.microsoft.com/office/drawing/2010/main" xmlns="" w="9525">
+                  <a14:hiddenLine xmlns="" xmlns:a14="http://schemas.microsoft.com/office/drawing/2010/main" w="9525">
                     <a:solidFill>
                       <a:srgbClr val="000000"/>
                     </a:solidFill>
@@ -11449,7 +11447,7 @@
               </a:ln>
               <a:extLst>
                 <a:ext uri="{91240B29-F687-4f45-9708-019B960494DF}">
-                  <a14:hiddenLine xmlns:a14="http://schemas.microsoft.com/office/drawing/2010/main" xmlns="" w="9525">
+                  <a14:hiddenLine xmlns="" xmlns:a14="http://schemas.microsoft.com/office/drawing/2010/main" w="9525">
                     <a:solidFill>
                       <a:srgbClr val="000000"/>
                     </a:solidFill>
@@ -11514,7 +11512,7 @@
               </a:ln>
               <a:extLst>
                 <a:ext uri="{91240B29-F687-4f45-9708-019B960494DF}">
-                  <a14:hiddenLine xmlns:a14="http://schemas.microsoft.com/office/drawing/2010/main" xmlns="" w="9525">
+                  <a14:hiddenLine xmlns="" xmlns:a14="http://schemas.microsoft.com/office/drawing/2010/main" w="9525">
                     <a:solidFill>
                       <a:srgbClr val="000000"/>
                     </a:solidFill>
@@ -11576,7 +11574,7 @@
               </a:ln>
               <a:extLst>
                 <a:ext uri="{91240B29-F687-4f45-9708-019B960494DF}">
-                  <a14:hiddenLine xmlns:a14="http://schemas.microsoft.com/office/drawing/2010/main" xmlns="" w="9525">
+                  <a14:hiddenLine xmlns="" xmlns:a14="http://schemas.microsoft.com/office/drawing/2010/main" w="9525">
                     <a:solidFill>
                       <a:srgbClr val="000000"/>
                     </a:solidFill>
@@ -11666,7 +11664,7 @@
               </a:ln>
               <a:extLst>
                 <a:ext uri="{91240B29-F687-4f45-9708-019B960494DF}">
-                  <a14:hiddenLine xmlns:a14="http://schemas.microsoft.com/office/drawing/2010/main" xmlns="" w="9525">
+                  <a14:hiddenLine xmlns="" xmlns:a14="http://schemas.microsoft.com/office/drawing/2010/main" w="9525">
                     <a:solidFill>
                       <a:srgbClr val="000000"/>
                     </a:solidFill>
@@ -11756,7 +11754,7 @@
               </a:ln>
               <a:extLst>
                 <a:ext uri="{91240B29-F687-4f45-9708-019B960494DF}">
-                  <a14:hiddenLine xmlns:a14="http://schemas.microsoft.com/office/drawing/2010/main" xmlns="" w="9525">
+                  <a14:hiddenLine xmlns="" xmlns:a14="http://schemas.microsoft.com/office/drawing/2010/main" w="9525">
                     <a:solidFill>
                       <a:srgbClr val="000000"/>
                     </a:solidFill>
@@ -11821,7 +11819,7 @@
               </a:ln>
               <a:extLst>
                 <a:ext uri="{91240B29-F687-4f45-9708-019B960494DF}">
-                  <a14:hiddenLine xmlns:a14="http://schemas.microsoft.com/office/drawing/2010/main" xmlns="" w="9525">
+                  <a14:hiddenLine xmlns="" xmlns:a14="http://schemas.microsoft.com/office/drawing/2010/main" w="9525">
                     <a:solidFill>
                       <a:srgbClr val="000000"/>
                     </a:solidFill>
@@ -11941,7 +11939,7 @@
               </a:ln>
               <a:extLst>
                 <a:ext uri="{91240B29-F687-4f45-9708-019B960494DF}">
-                  <a14:hiddenLine xmlns:a14="http://schemas.microsoft.com/office/drawing/2010/main" xmlns="" w="9525">
+                  <a14:hiddenLine xmlns="" xmlns:a14="http://schemas.microsoft.com/office/drawing/2010/main" w="9525">
                     <a:solidFill>
                       <a:srgbClr val="000000"/>
                     </a:solidFill>
@@ -12039,7 +12037,7 @@
               </a:ln>
               <a:extLst>
                 <a:ext uri="{91240B29-F687-4f45-9708-019B960494DF}">
-                  <a14:hiddenLine xmlns:a14="http://schemas.microsoft.com/office/drawing/2010/main" xmlns="" w="9525">
+                  <a14:hiddenLine xmlns="" xmlns:a14="http://schemas.microsoft.com/office/drawing/2010/main" w="9525">
                     <a:solidFill>
                       <a:srgbClr val="000000"/>
                     </a:solidFill>
@@ -12154,7 +12152,7 @@
               </a:ln>
               <a:extLst>
                 <a:ext uri="{91240B29-F687-4f45-9708-019B960494DF}">
-                  <a14:hiddenLine xmlns:a14="http://schemas.microsoft.com/office/drawing/2010/main" xmlns="" w="9525">
+                  <a14:hiddenLine xmlns="" xmlns:a14="http://schemas.microsoft.com/office/drawing/2010/main" w="9525">
                     <a:solidFill>
                       <a:srgbClr val="000000"/>
                     </a:solidFill>
@@ -12244,7 +12242,7 @@
               </a:ln>
               <a:extLst>
                 <a:ext uri="{91240B29-F687-4f45-9708-019B960494DF}">
-                  <a14:hiddenLine xmlns:a14="http://schemas.microsoft.com/office/drawing/2010/main" xmlns="" w="9525">
+                  <a14:hiddenLine xmlns="" xmlns:a14="http://schemas.microsoft.com/office/drawing/2010/main" w="9525">
                     <a:solidFill>
                       <a:srgbClr val="000000"/>
                     </a:solidFill>
@@ -12309,7 +12307,7 @@
               </a:ln>
               <a:extLst>
                 <a:ext uri="{91240B29-F687-4f45-9708-019B960494DF}">
-                  <a14:hiddenLine xmlns:a14="http://schemas.microsoft.com/office/drawing/2010/main" xmlns="" w="9525">
+                  <a14:hiddenLine xmlns="" xmlns:a14="http://schemas.microsoft.com/office/drawing/2010/main" w="9525">
                     <a:solidFill>
                       <a:srgbClr val="000000"/>
                     </a:solidFill>
@@ -12399,7 +12397,7 @@
               </a:ln>
               <a:extLst>
                 <a:ext uri="{91240B29-F687-4f45-9708-019B960494DF}">
-                  <a14:hiddenLine xmlns:a14="http://schemas.microsoft.com/office/drawing/2010/main" xmlns="" w="9525">
+                  <a14:hiddenLine xmlns="" xmlns:a14="http://schemas.microsoft.com/office/drawing/2010/main" w="9525">
                     <a:solidFill>
                       <a:srgbClr val="000000"/>
                     </a:solidFill>
@@ -12467,7 +12465,7 @@
               </a:ln>
               <a:extLst>
                 <a:ext uri="{91240B29-F687-4f45-9708-019B960494DF}">
-                  <a14:hiddenLine xmlns:a14="http://schemas.microsoft.com/office/drawing/2010/main" xmlns="" w="9525">
+                  <a14:hiddenLine xmlns="" xmlns:a14="http://schemas.microsoft.com/office/drawing/2010/main" w="9525">
                     <a:solidFill>
                       <a:srgbClr val="000000"/>
                     </a:solidFill>
@@ -12557,7 +12555,7 @@
               </a:ln>
               <a:extLst>
                 <a:ext uri="{91240B29-F687-4f45-9708-019B960494DF}">
-                  <a14:hiddenLine xmlns:a14="http://schemas.microsoft.com/office/drawing/2010/main" xmlns="" w="9525">
+                  <a14:hiddenLine xmlns="" xmlns:a14="http://schemas.microsoft.com/office/drawing/2010/main" w="9525">
                     <a:solidFill>
                       <a:srgbClr val="000000"/>
                     </a:solidFill>
@@ -12625,7 +12623,7 @@
               </a:ln>
               <a:extLst>
                 <a:ext uri="{91240B29-F687-4f45-9708-019B960494DF}">
-                  <a14:hiddenLine xmlns:a14="http://schemas.microsoft.com/office/drawing/2010/main" xmlns="" w="9525">
+                  <a14:hiddenLine xmlns="" xmlns:a14="http://schemas.microsoft.com/office/drawing/2010/main" w="9525">
                     <a:solidFill>
                       <a:srgbClr val="000000"/>
                     </a:solidFill>
@@ -12715,7 +12713,7 @@
               </a:ln>
               <a:extLst>
                 <a:ext uri="{91240B29-F687-4f45-9708-019B960494DF}">
-                  <a14:hiddenLine xmlns:a14="http://schemas.microsoft.com/office/drawing/2010/main" xmlns="" w="9525">
+                  <a14:hiddenLine xmlns="" xmlns:a14="http://schemas.microsoft.com/office/drawing/2010/main" w="9525">
                     <a:solidFill>
                       <a:srgbClr val="000000"/>
                     </a:solidFill>
@@ -12749,7 +12747,7 @@
               </a:ln>
               <a:extLst>
                 <a:ext uri="{91240B29-F687-4f45-9708-019B960494DF}">
-                  <a14:hiddenLine xmlns:a14="http://schemas.microsoft.com/office/drawing/2010/main" xmlns="" w="9525">
+                  <a14:hiddenLine xmlns="" xmlns:a14="http://schemas.microsoft.com/office/drawing/2010/main" w="9525">
                     <a:solidFill>
                       <a:srgbClr val="000000"/>
                     </a:solidFill>
@@ -12889,7 +12887,7 @@
           <a:p>
             <a:fld id="{DF502B2A-9274-4FE7-A76D-3524148FACFA}" type="datetime1">
               <a:rPr lang="en-US" smtClean="0"/>
-              <a:t>1/23/2017</a:t>
+              <a:t>2/8/2017</a:t>
             </a:fld>
             <a:endParaRPr lang="en-US" dirty="0"/>
           </a:p>
@@ -13431,477 +13429,6 @@
           </a:prstGeom>
         </p:spPr>
       </p:pic>
-      <p:sp>
-        <p:nvSpPr>
-          <p:cNvPr id="6" name="Oval 5">
-            <a:hlinkClick r:id="rId4" action="ppaction://hlinksldjump"/>
-          </p:cNvPr>
-          <p:cNvSpPr/>
-          <p:nvPr/>
-        </p:nvSpPr>
-        <p:spPr>
-          <a:xfrm>
-            <a:off x="7739834" y="4807635"/>
-            <a:ext cx="548640" cy="604911"/>
-          </a:xfrm>
-          <a:prstGeom prst="ellipse">
-            <a:avLst/>
-          </a:prstGeom>
-          <a:solidFill>
-            <a:schemeClr val="accent4">
-              <a:lumMod val="20000"/>
-              <a:lumOff val="80000"/>
-            </a:schemeClr>
-          </a:solidFill>
-          <a:ln>
-            <a:noFill/>
-          </a:ln>
-        </p:spPr>
-        <p:style>
-          <a:lnRef idx="2">
-            <a:schemeClr val="accent1">
-              <a:shade val="50000"/>
-            </a:schemeClr>
-          </a:lnRef>
-          <a:fillRef idx="1">
-            <a:schemeClr val="accent1"/>
-          </a:fillRef>
-          <a:effectRef idx="0">
-            <a:schemeClr val="accent1"/>
-          </a:effectRef>
-          <a:fontRef idx="minor">
-            <a:schemeClr val="lt1"/>
-          </a:fontRef>
-        </p:style>
-        <p:txBody>
-          <a:bodyPr rtlCol="0" anchor="ctr"/>
-          <a:lstStyle/>
-          <a:p>
-            <a:pPr algn="ctr"/>
-            <a:r>
-              <a:rPr lang="en-GB" dirty="0">
-                <a:solidFill>
-                  <a:schemeClr val="bg1"/>
-                </a:solidFill>
-                <a:latin typeface="Courier New" panose="02070309020205020404" pitchFamily="49" charset="0"/>
-                <a:cs typeface="Courier New" panose="02070309020205020404" pitchFamily="49" charset="0"/>
-              </a:rPr>
-              <a:t>1</a:t>
-            </a:r>
-          </a:p>
-        </p:txBody>
-      </p:sp>
-      <p:sp>
-        <p:nvSpPr>
-          <p:cNvPr id="7" name="Oval 6">
-            <a:hlinkClick r:id="rId5" action="ppaction://hlinksldjump"/>
-          </p:cNvPr>
-          <p:cNvSpPr/>
-          <p:nvPr/>
-        </p:nvSpPr>
-        <p:spPr>
-          <a:xfrm>
-            <a:off x="8471786" y="4807635"/>
-            <a:ext cx="548640" cy="604911"/>
-          </a:xfrm>
-          <a:prstGeom prst="ellipse">
-            <a:avLst/>
-          </a:prstGeom>
-          <a:solidFill>
-            <a:schemeClr val="accent4">
-              <a:lumMod val="40000"/>
-              <a:lumOff val="60000"/>
-            </a:schemeClr>
-          </a:solidFill>
-          <a:ln>
-            <a:noFill/>
-          </a:ln>
-        </p:spPr>
-        <p:style>
-          <a:lnRef idx="2">
-            <a:schemeClr val="accent1">
-              <a:shade val="50000"/>
-            </a:schemeClr>
-          </a:lnRef>
-          <a:fillRef idx="1">
-            <a:schemeClr val="accent1"/>
-          </a:fillRef>
-          <a:effectRef idx="0">
-            <a:schemeClr val="accent1"/>
-          </a:effectRef>
-          <a:fontRef idx="minor">
-            <a:schemeClr val="lt1"/>
-          </a:fontRef>
-        </p:style>
-        <p:txBody>
-          <a:bodyPr rtlCol="0" anchor="ctr"/>
-          <a:lstStyle/>
-          <a:p>
-            <a:pPr algn="ctr"/>
-            <a:r>
-              <a:rPr lang="en-GB" dirty="0">
-                <a:solidFill>
-                  <a:schemeClr val="bg1"/>
-                </a:solidFill>
-                <a:latin typeface="Courier New" panose="02070309020205020404" pitchFamily="49" charset="0"/>
-                <a:cs typeface="Courier New" panose="02070309020205020404" pitchFamily="49" charset="0"/>
-              </a:rPr>
-              <a:t>2</a:t>
-            </a:r>
-          </a:p>
-        </p:txBody>
-      </p:sp>
-      <p:sp>
-        <p:nvSpPr>
-          <p:cNvPr id="8" name="Oval 7">
-            <a:hlinkClick r:id="" action="ppaction://noaction"/>
-          </p:cNvPr>
-          <p:cNvSpPr/>
-          <p:nvPr/>
-        </p:nvSpPr>
-        <p:spPr>
-          <a:xfrm>
-            <a:off x="9212036" y="4805291"/>
-            <a:ext cx="548640" cy="604911"/>
-          </a:xfrm>
-          <a:prstGeom prst="ellipse">
-            <a:avLst/>
-          </a:prstGeom>
-          <a:solidFill>
-            <a:schemeClr val="accent4">
-              <a:lumMod val="60000"/>
-              <a:lumOff val="40000"/>
-            </a:schemeClr>
-          </a:solidFill>
-          <a:ln>
-            <a:noFill/>
-          </a:ln>
-        </p:spPr>
-        <p:style>
-          <a:lnRef idx="2">
-            <a:schemeClr val="accent1">
-              <a:shade val="50000"/>
-            </a:schemeClr>
-          </a:lnRef>
-          <a:fillRef idx="1">
-            <a:schemeClr val="accent1"/>
-          </a:fillRef>
-          <a:effectRef idx="0">
-            <a:schemeClr val="accent1"/>
-          </a:effectRef>
-          <a:fontRef idx="minor">
-            <a:schemeClr val="lt1"/>
-          </a:fontRef>
-        </p:style>
-        <p:txBody>
-          <a:bodyPr rtlCol="0" anchor="ctr"/>
-          <a:lstStyle/>
-          <a:p>
-            <a:pPr algn="ctr"/>
-            <a:r>
-              <a:rPr lang="en-GB" dirty="0">
-                <a:solidFill>
-                  <a:schemeClr val="bg1"/>
-                </a:solidFill>
-                <a:latin typeface="Courier New" panose="02070309020205020404" pitchFamily="49" charset="0"/>
-                <a:cs typeface="Courier New" panose="02070309020205020404" pitchFamily="49" charset="0"/>
-              </a:rPr>
-              <a:t>3</a:t>
-            </a:r>
-          </a:p>
-        </p:txBody>
-      </p:sp>
-      <p:sp>
-        <p:nvSpPr>
-          <p:cNvPr id="9" name="Oval 8">
-            <a:hlinkClick r:id="" action="ppaction://noaction"/>
-          </p:cNvPr>
-          <p:cNvSpPr/>
-          <p:nvPr/>
-        </p:nvSpPr>
-        <p:spPr>
-          <a:xfrm>
-            <a:off x="9952286" y="4805290"/>
-            <a:ext cx="548640" cy="604911"/>
-          </a:xfrm>
-          <a:prstGeom prst="ellipse">
-            <a:avLst/>
-          </a:prstGeom>
-          <a:solidFill>
-            <a:schemeClr val="accent4">
-              <a:lumMod val="75000"/>
-            </a:schemeClr>
-          </a:solidFill>
-          <a:ln>
-            <a:noFill/>
-          </a:ln>
-        </p:spPr>
-        <p:style>
-          <a:lnRef idx="2">
-            <a:schemeClr val="accent1">
-              <a:shade val="50000"/>
-            </a:schemeClr>
-          </a:lnRef>
-          <a:fillRef idx="1">
-            <a:schemeClr val="accent1"/>
-          </a:fillRef>
-          <a:effectRef idx="0">
-            <a:schemeClr val="accent1"/>
-          </a:effectRef>
-          <a:fontRef idx="minor">
-            <a:schemeClr val="lt1"/>
-          </a:fontRef>
-        </p:style>
-        <p:txBody>
-          <a:bodyPr rtlCol="0" anchor="ctr"/>
-          <a:lstStyle/>
-          <a:p>
-            <a:pPr algn="ctr"/>
-            <a:r>
-              <a:rPr lang="en-GB" dirty="0">
-                <a:solidFill>
-                  <a:schemeClr val="bg1"/>
-                </a:solidFill>
-                <a:latin typeface="Courier New" panose="02070309020205020404" pitchFamily="49" charset="0"/>
-                <a:cs typeface="Courier New" panose="02070309020205020404" pitchFamily="49" charset="0"/>
-              </a:rPr>
-              <a:t>4</a:t>
-            </a:r>
-          </a:p>
-        </p:txBody>
-      </p:sp>
-      <p:sp>
-        <p:nvSpPr>
-          <p:cNvPr id="10" name="Oval 9">
-            <a:hlinkClick r:id="" action="ppaction://noaction"/>
-          </p:cNvPr>
-          <p:cNvSpPr/>
-          <p:nvPr/>
-        </p:nvSpPr>
-        <p:spPr>
-          <a:xfrm>
-            <a:off x="7739834" y="5584706"/>
-            <a:ext cx="548640" cy="604911"/>
-          </a:xfrm>
-          <a:prstGeom prst="ellipse">
-            <a:avLst/>
-          </a:prstGeom>
-          <a:solidFill>
-            <a:schemeClr val="accent4">
-              <a:lumMod val="50000"/>
-            </a:schemeClr>
-          </a:solidFill>
-          <a:ln>
-            <a:noFill/>
-          </a:ln>
-        </p:spPr>
-        <p:style>
-          <a:lnRef idx="2">
-            <a:schemeClr val="accent1">
-              <a:shade val="50000"/>
-            </a:schemeClr>
-          </a:lnRef>
-          <a:fillRef idx="1">
-            <a:schemeClr val="accent1"/>
-          </a:fillRef>
-          <a:effectRef idx="0">
-            <a:schemeClr val="accent1"/>
-          </a:effectRef>
-          <a:fontRef idx="minor">
-            <a:schemeClr val="lt1"/>
-          </a:fontRef>
-        </p:style>
-        <p:txBody>
-          <a:bodyPr rtlCol="0" anchor="ctr"/>
-          <a:lstStyle/>
-          <a:p>
-            <a:pPr algn="ctr"/>
-            <a:r>
-              <a:rPr lang="en-GB" dirty="0">
-                <a:solidFill>
-                  <a:schemeClr val="bg1"/>
-                </a:solidFill>
-                <a:latin typeface="Courier New" panose="02070309020205020404" pitchFamily="49" charset="0"/>
-                <a:cs typeface="Courier New" panose="02070309020205020404" pitchFamily="49" charset="0"/>
-              </a:rPr>
-              <a:t>5</a:t>
-            </a:r>
-          </a:p>
-        </p:txBody>
-      </p:sp>
-      <p:sp>
-        <p:nvSpPr>
-          <p:cNvPr id="11" name="Oval 10"/>
-          <p:cNvSpPr/>
-          <p:nvPr/>
-        </p:nvSpPr>
-        <p:spPr>
-          <a:xfrm>
-            <a:off x="8471786" y="5584706"/>
-            <a:ext cx="548640" cy="604911"/>
-          </a:xfrm>
-          <a:prstGeom prst="ellipse">
-            <a:avLst/>
-          </a:prstGeom>
-          <a:solidFill>
-            <a:schemeClr val="accent4">
-              <a:lumMod val="75000"/>
-            </a:schemeClr>
-          </a:solidFill>
-          <a:ln>
-            <a:noFill/>
-          </a:ln>
-        </p:spPr>
-        <p:style>
-          <a:lnRef idx="2">
-            <a:schemeClr val="accent1">
-              <a:shade val="50000"/>
-            </a:schemeClr>
-          </a:lnRef>
-          <a:fillRef idx="1">
-            <a:schemeClr val="accent1"/>
-          </a:fillRef>
-          <a:effectRef idx="0">
-            <a:schemeClr val="accent1"/>
-          </a:effectRef>
-          <a:fontRef idx="minor">
-            <a:schemeClr val="lt1"/>
-          </a:fontRef>
-        </p:style>
-        <p:txBody>
-          <a:bodyPr rtlCol="0" anchor="ctr"/>
-          <a:lstStyle/>
-          <a:p>
-            <a:pPr algn="ctr"/>
-            <a:r>
-              <a:rPr lang="en-GB" dirty="0">
-                <a:solidFill>
-                  <a:schemeClr val="bg1"/>
-                </a:solidFill>
-                <a:latin typeface="Courier New" panose="02070309020205020404" pitchFamily="49" charset="0"/>
-                <a:cs typeface="Courier New" panose="02070309020205020404" pitchFamily="49" charset="0"/>
-              </a:rPr>
-              <a:t>6</a:t>
-            </a:r>
-          </a:p>
-        </p:txBody>
-      </p:sp>
-      <p:sp>
-        <p:nvSpPr>
-          <p:cNvPr id="12" name="Oval 11"/>
-          <p:cNvSpPr/>
-          <p:nvPr/>
-        </p:nvSpPr>
-        <p:spPr>
-          <a:xfrm>
-            <a:off x="9212036" y="5582362"/>
-            <a:ext cx="548640" cy="604911"/>
-          </a:xfrm>
-          <a:prstGeom prst="ellipse">
-            <a:avLst/>
-          </a:prstGeom>
-          <a:solidFill>
-            <a:schemeClr val="accent4">
-              <a:lumMod val="60000"/>
-              <a:lumOff val="40000"/>
-            </a:schemeClr>
-          </a:solidFill>
-          <a:ln>
-            <a:noFill/>
-          </a:ln>
-        </p:spPr>
-        <p:style>
-          <a:lnRef idx="2">
-            <a:schemeClr val="accent1">
-              <a:shade val="50000"/>
-            </a:schemeClr>
-          </a:lnRef>
-          <a:fillRef idx="1">
-            <a:schemeClr val="accent1"/>
-          </a:fillRef>
-          <a:effectRef idx="0">
-            <a:schemeClr val="accent1"/>
-          </a:effectRef>
-          <a:fontRef idx="minor">
-            <a:schemeClr val="lt1"/>
-          </a:fontRef>
-        </p:style>
-        <p:txBody>
-          <a:bodyPr rtlCol="0" anchor="ctr"/>
-          <a:lstStyle/>
-          <a:p>
-            <a:pPr algn="ctr"/>
-            <a:r>
-              <a:rPr lang="en-GB" dirty="0">
-                <a:solidFill>
-                  <a:schemeClr val="bg1"/>
-                </a:solidFill>
-                <a:latin typeface="Courier New" panose="02070309020205020404" pitchFamily="49" charset="0"/>
-                <a:cs typeface="Courier New" panose="02070309020205020404" pitchFamily="49" charset="0"/>
-              </a:rPr>
-              <a:t>7</a:t>
-            </a:r>
-          </a:p>
-        </p:txBody>
-      </p:sp>
-      <p:sp>
-        <p:nvSpPr>
-          <p:cNvPr id="13" name="Oval 12"/>
-          <p:cNvSpPr/>
-          <p:nvPr/>
-        </p:nvSpPr>
-        <p:spPr>
-          <a:xfrm>
-            <a:off x="9952286" y="5582361"/>
-            <a:ext cx="548640" cy="604911"/>
-          </a:xfrm>
-          <a:prstGeom prst="ellipse">
-            <a:avLst/>
-          </a:prstGeom>
-          <a:solidFill>
-            <a:schemeClr val="accent4">
-              <a:lumMod val="40000"/>
-              <a:lumOff val="60000"/>
-            </a:schemeClr>
-          </a:solidFill>
-          <a:ln>
-            <a:noFill/>
-          </a:ln>
-        </p:spPr>
-        <p:style>
-          <a:lnRef idx="2">
-            <a:schemeClr val="accent1">
-              <a:shade val="50000"/>
-            </a:schemeClr>
-          </a:lnRef>
-          <a:fillRef idx="1">
-            <a:schemeClr val="accent1"/>
-          </a:fillRef>
-          <a:effectRef idx="0">
-            <a:schemeClr val="accent1"/>
-          </a:effectRef>
-          <a:fontRef idx="minor">
-            <a:schemeClr val="lt1"/>
-          </a:fontRef>
-        </p:style>
-        <p:txBody>
-          <a:bodyPr rtlCol="0" anchor="ctr"/>
-          <a:lstStyle/>
-          <a:p>
-            <a:pPr algn="ctr"/>
-            <a:r>
-              <a:rPr lang="en-GB" dirty="0">
-                <a:solidFill>
-                  <a:schemeClr val="bg1"/>
-                </a:solidFill>
-                <a:latin typeface="Courier New" panose="02070309020205020404" pitchFamily="49" charset="0"/>
-                <a:cs typeface="Courier New" panose="02070309020205020404" pitchFamily="49" charset="0"/>
-              </a:rPr>
-              <a:t>8</a:t>
-            </a:r>
-          </a:p>
-        </p:txBody>
-      </p:sp>
     </p:spTree>
     <p:extLst>
       <p:ext uri="{BB962C8B-B14F-4D97-AF65-F5344CB8AC3E}">
@@ -13949,7 +13476,7 @@
           <a:p>
             <a:r>
               <a:rPr lang="en-GB" dirty="0"/>
-              <a:t>Course Outline</a:t>
+              <a:t>List Indexing</a:t>
             </a:r>
           </a:p>
         </p:txBody>
@@ -13966,73 +13493,341 @@
         </p:nvSpPr>
         <p:spPr>
           <a:xfrm>
-            <a:off x="1141412" y="1843548"/>
-            <a:ext cx="9905999" cy="3947653"/>
+            <a:off x="1141412" y="2097088"/>
+            <a:ext cx="9905999" cy="3669532"/>
           </a:xfrm>
           <a:solidFill>
             <a:srgbClr val="36AAC5"/>
           </a:solidFill>
         </p:spPr>
         <p:txBody>
-          <a:bodyPr>
-            <a:normAutofit fontScale="92500" lnSpcReduction="10000"/>
+          <a:bodyPr numCol="1">
+            <a:normAutofit/>
           </a:bodyPr>
           <a:lstStyle/>
           <a:p>
-            <a:r>
-              <a:rPr lang="en-GB" dirty="0"/>
-              <a:t>Installation &amp; setup</a:t>
-            </a:r>
-          </a:p>
-          <a:p>
-            <a:r>
-              <a:rPr lang="en-GB" dirty="0"/>
-              <a:t>Introduction to data types</a:t>
-            </a:r>
-          </a:p>
-          <a:p>
-            <a:r>
-              <a:rPr lang="en-GB" dirty="0"/>
-              <a:t>Introduction to if statements and loops</a:t>
-            </a:r>
-          </a:p>
-          <a:p>
-            <a:r>
-              <a:rPr lang="en-GB" dirty="0"/>
-              <a:t>Using built-in functions, defining new functions and using them</a:t>
-            </a:r>
-          </a:p>
-          <a:p>
-            <a:r>
-              <a:rPr lang="en-GB" dirty="0"/>
-              <a:t>Using libraries – time, maths, GUI</a:t>
-            </a:r>
-          </a:p>
-          <a:p>
-            <a:r>
-              <a:rPr lang="en-GB" dirty="0"/>
-              <a:t>Introduction to classes</a:t>
-            </a:r>
-          </a:p>
-          <a:p>
-            <a:r>
-              <a:rPr lang="en-GB" dirty="0"/>
-              <a:t>Creating and using your own classes</a:t>
-            </a:r>
-          </a:p>
-          <a:p>
-            <a:r>
-              <a:rPr lang="en-GB" dirty="0"/>
-              <a:t>Steps to make </a:t>
-            </a:r>
-            <a:r>
-              <a:rPr lang="en-GB"/>
-              <a:t>a game</a:t>
-            </a:r>
-            <a:endParaRPr lang="en-GB" dirty="0"/>
-          </a:p>
-          <a:p>
-            <a:endParaRPr lang="en-GB" dirty="0"/>
+            <a:pPr>
+              <a:spcBef>
+                <a:spcPts val="1200"/>
+              </a:spcBef>
+            </a:pPr>
+            <a:r>
+              <a:rPr lang="en-GB" dirty="0">
+                <a:cs typeface="Courier New" panose="02070309020205020404" pitchFamily="49" charset="0"/>
+              </a:rPr>
+              <a:t>Create a list e.g. </a:t>
+            </a:r>
+            <a:r>
+              <a:rPr lang="en-GB" dirty="0" err="1">
+                <a:solidFill>
+                  <a:srgbClr val="7030A0"/>
+                </a:solidFill>
+                <a:latin typeface="Courier New" panose="02070309020205020404" pitchFamily="49" charset="0"/>
+                <a:cs typeface="Courier New" panose="02070309020205020404" pitchFamily="49" charset="0"/>
+              </a:rPr>
+              <a:t>my_list</a:t>
+            </a:r>
+            <a:r>
+              <a:rPr lang="en-GB" dirty="0">
+                <a:solidFill>
+                  <a:srgbClr val="7030A0"/>
+                </a:solidFill>
+                <a:latin typeface="Courier New" panose="02070309020205020404" pitchFamily="49" charset="0"/>
+                <a:cs typeface="Courier New" panose="02070309020205020404" pitchFamily="49" charset="0"/>
+              </a:rPr>
+              <a:t> = [3, -4, 2, 0, 3, 9]</a:t>
+            </a:r>
+            <a:endParaRPr lang="en-GB" dirty="0">
+              <a:cs typeface="Courier New" panose="02070309020205020404" pitchFamily="49" charset="0"/>
+            </a:endParaRPr>
+          </a:p>
+          <a:p>
+            <a:pPr>
+              <a:spcBef>
+                <a:spcPts val="1200"/>
+              </a:spcBef>
+            </a:pPr>
+            <a:r>
+              <a:rPr lang="en-GB" dirty="0">
+                <a:cs typeface="Courier New" panose="02070309020205020404" pitchFamily="49" charset="0"/>
+              </a:rPr>
+              <a:t>Indexing: </a:t>
+            </a:r>
+            <a:r>
+              <a:rPr lang="en-GB" dirty="0">
+                <a:latin typeface="Courier New" panose="02070309020205020404" pitchFamily="49" charset="0"/>
+                <a:cs typeface="Courier New" panose="02070309020205020404" pitchFamily="49" charset="0"/>
+              </a:rPr>
+              <a:t>list[index]</a:t>
+            </a:r>
+            <a:r>
+              <a:rPr lang="en-GB" dirty="0">
+                <a:cs typeface="Courier New" panose="02070309020205020404" pitchFamily="49" charset="0"/>
+              </a:rPr>
+              <a:t> e.g. </a:t>
+            </a:r>
+            <a:r>
+              <a:rPr lang="en-GB" dirty="0" err="1">
+                <a:solidFill>
+                  <a:srgbClr val="7030A0"/>
+                </a:solidFill>
+                <a:latin typeface="Courier New" panose="02070309020205020404" pitchFamily="49" charset="0"/>
+                <a:cs typeface="Courier New" panose="02070309020205020404" pitchFamily="49" charset="0"/>
+              </a:rPr>
+              <a:t>my_list</a:t>
+            </a:r>
+            <a:r>
+              <a:rPr lang="en-GB" dirty="0">
+                <a:solidFill>
+                  <a:srgbClr val="7030A0"/>
+                </a:solidFill>
+                <a:latin typeface="Courier New" panose="02070309020205020404" pitchFamily="49" charset="0"/>
+                <a:cs typeface="Courier New" panose="02070309020205020404" pitchFamily="49" charset="0"/>
+              </a:rPr>
+              <a:t>[0]</a:t>
+            </a:r>
+            <a:r>
+              <a:rPr lang="en-GB" dirty="0">
+                <a:cs typeface="Courier New" panose="02070309020205020404" pitchFamily="49" charset="0"/>
+              </a:rPr>
+              <a:t>, </a:t>
+            </a:r>
+            <a:r>
+              <a:rPr lang="en-GB" dirty="0" err="1">
+                <a:solidFill>
+                  <a:srgbClr val="7030A0"/>
+                </a:solidFill>
+                <a:latin typeface="Courier New" panose="02070309020205020404" pitchFamily="49" charset="0"/>
+                <a:cs typeface="Courier New" panose="02070309020205020404" pitchFamily="49" charset="0"/>
+              </a:rPr>
+              <a:t>my_list</a:t>
+            </a:r>
+            <a:r>
+              <a:rPr lang="en-GB" dirty="0">
+                <a:solidFill>
+                  <a:srgbClr val="7030A0"/>
+                </a:solidFill>
+                <a:latin typeface="Courier New" panose="02070309020205020404" pitchFamily="49" charset="0"/>
+                <a:cs typeface="Courier New" panose="02070309020205020404" pitchFamily="49" charset="0"/>
+              </a:rPr>
+              <a:t>[-2]</a:t>
+            </a:r>
+          </a:p>
+          <a:p>
+            <a:pPr>
+              <a:spcBef>
+                <a:spcPts val="1200"/>
+              </a:spcBef>
+            </a:pPr>
+            <a:r>
+              <a:rPr lang="en-GB" dirty="0">
+                <a:cs typeface="Courier New" panose="02070309020205020404" pitchFamily="49" charset="0"/>
+              </a:rPr>
+              <a:t>Slicing: </a:t>
+            </a:r>
+            <a:r>
+              <a:rPr lang="en-GB" dirty="0">
+                <a:latin typeface="Courier New" panose="02070309020205020404" pitchFamily="49" charset="0"/>
+                <a:cs typeface="Courier New" panose="02070309020205020404" pitchFamily="49" charset="0"/>
+              </a:rPr>
+              <a:t>list[</a:t>
+            </a:r>
+            <a:r>
+              <a:rPr lang="en-GB" dirty="0" err="1">
+                <a:latin typeface="Courier New" panose="02070309020205020404" pitchFamily="49" charset="0"/>
+                <a:cs typeface="Courier New" panose="02070309020205020404" pitchFamily="49" charset="0"/>
+              </a:rPr>
+              <a:t>start:end</a:t>
+            </a:r>
+            <a:r>
+              <a:rPr lang="en-GB" dirty="0">
+                <a:latin typeface="Courier New" panose="02070309020205020404" pitchFamily="49" charset="0"/>
+                <a:cs typeface="Courier New" panose="02070309020205020404" pitchFamily="49" charset="0"/>
+              </a:rPr>
+              <a:t>]</a:t>
+            </a:r>
+            <a:r>
+              <a:rPr lang="en-GB" dirty="0">
+                <a:cs typeface="Courier New" panose="02070309020205020404" pitchFamily="49" charset="0"/>
+              </a:rPr>
+              <a:t> e.g. </a:t>
+            </a:r>
+            <a:r>
+              <a:rPr lang="en-GB" dirty="0" err="1">
+                <a:solidFill>
+                  <a:srgbClr val="7030A0"/>
+                </a:solidFill>
+                <a:latin typeface="Courier New" panose="02070309020205020404" pitchFamily="49" charset="0"/>
+                <a:cs typeface="Courier New" panose="02070309020205020404" pitchFamily="49" charset="0"/>
+              </a:rPr>
+              <a:t>my_list</a:t>
+            </a:r>
+            <a:r>
+              <a:rPr lang="en-GB" dirty="0">
+                <a:solidFill>
+                  <a:srgbClr val="7030A0"/>
+                </a:solidFill>
+                <a:latin typeface="Courier New" panose="02070309020205020404" pitchFamily="49" charset="0"/>
+                <a:cs typeface="Courier New" panose="02070309020205020404" pitchFamily="49" charset="0"/>
+              </a:rPr>
+              <a:t>[1:3]</a:t>
+            </a:r>
+            <a:r>
+              <a:rPr lang="en-GB" dirty="0">
+                <a:cs typeface="Courier New" panose="02070309020205020404" pitchFamily="49" charset="0"/>
+              </a:rPr>
+              <a:t>, </a:t>
+            </a:r>
+            <a:r>
+              <a:rPr lang="en-GB" dirty="0" err="1">
+                <a:solidFill>
+                  <a:srgbClr val="7030A0"/>
+                </a:solidFill>
+                <a:latin typeface="Courier New" panose="02070309020205020404" pitchFamily="49" charset="0"/>
+                <a:cs typeface="Courier New" panose="02070309020205020404" pitchFamily="49" charset="0"/>
+              </a:rPr>
+              <a:t>my_list</a:t>
+            </a:r>
+            <a:r>
+              <a:rPr lang="en-GB" dirty="0">
+                <a:solidFill>
+                  <a:srgbClr val="7030A0"/>
+                </a:solidFill>
+                <a:latin typeface="Courier New" panose="02070309020205020404" pitchFamily="49" charset="0"/>
+                <a:cs typeface="Courier New" panose="02070309020205020404" pitchFamily="49" charset="0"/>
+              </a:rPr>
+              <a:t>[:-2]</a:t>
+            </a:r>
+            <a:r>
+              <a:rPr lang="en-GB" dirty="0">
+                <a:cs typeface="Courier New" panose="02070309020205020404" pitchFamily="49" charset="0"/>
+              </a:rPr>
+              <a:t>, </a:t>
+            </a:r>
+            <a:r>
+              <a:rPr lang="en-GB" dirty="0" err="1">
+                <a:solidFill>
+                  <a:srgbClr val="7030A0"/>
+                </a:solidFill>
+                <a:latin typeface="Courier New" panose="02070309020205020404" pitchFamily="49" charset="0"/>
+                <a:cs typeface="Courier New" panose="02070309020205020404" pitchFamily="49" charset="0"/>
+              </a:rPr>
+              <a:t>my_list</a:t>
+            </a:r>
+            <a:r>
+              <a:rPr lang="en-GB" dirty="0">
+                <a:solidFill>
+                  <a:srgbClr val="7030A0"/>
+                </a:solidFill>
+                <a:latin typeface="Courier New" panose="02070309020205020404" pitchFamily="49" charset="0"/>
+                <a:cs typeface="Courier New" panose="02070309020205020404" pitchFamily="49" charset="0"/>
+              </a:rPr>
+              <a:t>[:]</a:t>
+            </a:r>
+            <a:r>
+              <a:rPr lang="en-GB" dirty="0">
+                <a:latin typeface="+mj-lt"/>
+                <a:cs typeface="Courier New" panose="02070309020205020404" pitchFamily="49" charset="0"/>
+              </a:rPr>
+              <a:t> (copy the whole list)</a:t>
+            </a:r>
+          </a:p>
+          <a:p>
+            <a:pPr>
+              <a:spcBef>
+                <a:spcPts val="1200"/>
+              </a:spcBef>
+            </a:pPr>
+            <a:r>
+              <a:rPr lang="en-GB" dirty="0">
+                <a:cs typeface="Courier New" panose="02070309020205020404" pitchFamily="49" charset="0"/>
+              </a:rPr>
+              <a:t>More complex slicing: </a:t>
+            </a:r>
+            <a:r>
+              <a:rPr lang="en-GB" dirty="0">
+                <a:latin typeface="Courier New" panose="02070309020205020404" pitchFamily="49" charset="0"/>
+                <a:cs typeface="Courier New" panose="02070309020205020404" pitchFamily="49" charset="0"/>
+              </a:rPr>
+              <a:t>list[</a:t>
+            </a:r>
+            <a:r>
+              <a:rPr lang="en-GB" dirty="0" err="1">
+                <a:latin typeface="Courier New" panose="02070309020205020404" pitchFamily="49" charset="0"/>
+                <a:cs typeface="Courier New" panose="02070309020205020404" pitchFamily="49" charset="0"/>
+              </a:rPr>
+              <a:t>start:end:step</a:t>
+            </a:r>
+            <a:r>
+              <a:rPr lang="en-GB" dirty="0">
+                <a:latin typeface="Courier New" panose="02070309020205020404" pitchFamily="49" charset="0"/>
+                <a:cs typeface="Courier New" panose="02070309020205020404" pitchFamily="49" charset="0"/>
+              </a:rPr>
+              <a:t>]</a:t>
+            </a:r>
+            <a:r>
+              <a:rPr lang="en-GB" dirty="0">
+                <a:cs typeface="Courier New" panose="02070309020205020404" pitchFamily="49" charset="0"/>
+              </a:rPr>
+              <a:t> e.g. </a:t>
+            </a:r>
+            <a:r>
+              <a:rPr lang="en-GB" dirty="0" err="1">
+                <a:solidFill>
+                  <a:srgbClr val="7030A0"/>
+                </a:solidFill>
+                <a:latin typeface="Courier New" panose="02070309020205020404" pitchFamily="49" charset="0"/>
+                <a:cs typeface="Courier New" panose="02070309020205020404" pitchFamily="49" charset="0"/>
+              </a:rPr>
+              <a:t>my_list</a:t>
+            </a:r>
+            <a:r>
+              <a:rPr lang="en-GB" dirty="0">
+                <a:solidFill>
+                  <a:srgbClr val="7030A0"/>
+                </a:solidFill>
+                <a:latin typeface="Courier New" panose="02070309020205020404" pitchFamily="49" charset="0"/>
+                <a:cs typeface="Courier New" panose="02070309020205020404" pitchFamily="49" charset="0"/>
+              </a:rPr>
+              <a:t>[1::2]</a:t>
+            </a:r>
+            <a:r>
+              <a:rPr lang="en-GB" dirty="0">
+                <a:cs typeface="Courier New" panose="02070309020205020404" pitchFamily="49" charset="0"/>
+              </a:rPr>
+              <a:t>, </a:t>
+            </a:r>
+            <a:r>
+              <a:rPr lang="en-GB" dirty="0" err="1">
+                <a:solidFill>
+                  <a:srgbClr val="7030A0"/>
+                </a:solidFill>
+                <a:latin typeface="Courier New" panose="02070309020205020404" pitchFamily="49" charset="0"/>
+                <a:cs typeface="Courier New" panose="02070309020205020404" pitchFamily="49" charset="0"/>
+              </a:rPr>
+              <a:t>my_list</a:t>
+            </a:r>
+            <a:r>
+              <a:rPr lang="en-GB" dirty="0">
+                <a:solidFill>
+                  <a:srgbClr val="7030A0"/>
+                </a:solidFill>
+                <a:latin typeface="Courier New" panose="02070309020205020404" pitchFamily="49" charset="0"/>
+                <a:cs typeface="Courier New" panose="02070309020205020404" pitchFamily="49" charset="0"/>
+              </a:rPr>
+              <a:t>[::-1]</a:t>
+            </a:r>
+            <a:r>
+              <a:rPr lang="en-GB" dirty="0">
+                <a:latin typeface="+mj-lt"/>
+                <a:cs typeface="Courier New" panose="02070309020205020404" pitchFamily="49" charset="0"/>
+              </a:rPr>
+              <a:t> (reverse the list)</a:t>
+            </a:r>
+            <a:endParaRPr lang="en-GB" dirty="0">
+              <a:latin typeface="Courier New" panose="02070309020205020404" pitchFamily="49" charset="0"/>
+              <a:cs typeface="Courier New" panose="02070309020205020404" pitchFamily="49" charset="0"/>
+            </a:endParaRPr>
           </a:p>
         </p:txBody>
       </p:sp>
@@ -14062,7 +13857,7 @@
     </p:spTree>
     <p:extLst>
       <p:ext uri="{BB962C8B-B14F-4D97-AF65-F5344CB8AC3E}">
-        <p14:creationId xmlns:p14="http://schemas.microsoft.com/office/powerpoint/2010/main" val="1656948211"/>
+        <p14:creationId xmlns:p14="http://schemas.microsoft.com/office/powerpoint/2010/main" val="2167833124"/>
       </p:ext>
     </p:extLst>
   </p:cSld>
@@ -14106,7 +13901,7 @@
           <a:p>
             <a:r>
               <a:rPr lang="en-GB" dirty="0"/>
-              <a:t>List Indexing</a:t>
+              <a:t>List Operations</a:t>
             </a:r>
           </a:p>
         </p:txBody>
@@ -14124,7 +13919,7 @@
         <p:spPr>
           <a:xfrm>
             <a:off x="1141412" y="2097088"/>
-            <a:ext cx="9905999" cy="3669532"/>
+            <a:ext cx="9905999" cy="3669531"/>
           </a:xfrm>
           <a:solidFill>
             <a:srgbClr val="36AAC5"/>
@@ -14145,7 +13940,7 @@
               <a:rPr lang="en-GB" dirty="0">
                 <a:cs typeface="Courier New" panose="02070309020205020404" pitchFamily="49" charset="0"/>
               </a:rPr>
-              <a:t>Create a list e.g. </a:t>
+              <a:t>Addition, multiplication: </a:t>
             </a:r>
             <a:r>
               <a:rPr lang="en-GB" dirty="0" err="1">
@@ -14165,36 +13960,23 @@
                 <a:latin typeface="Courier New" panose="02070309020205020404" pitchFamily="49" charset="0"/>
                 <a:cs typeface="Courier New" panose="02070309020205020404" pitchFamily="49" charset="0"/>
               </a:rPr>
-              <a:t> = [3, -4, 2, 0, 3, 9]</a:t>
-            </a:r>
-            <a:endParaRPr lang="en-GB" dirty="0">
-              <a:cs typeface="Courier New" panose="02070309020205020404" pitchFamily="49" charset="0"/>
-            </a:endParaRPr>
-          </a:p>
-          <a:p>
-            <a:pPr>
-              <a:spcBef>
-                <a:spcPts val="1200"/>
-              </a:spcBef>
-            </a:pPr>
+              <a:t>+[1, 2]</a:t>
+            </a:r>
             <a:r>
               <a:rPr lang="en-GB" dirty="0">
                 <a:cs typeface="Courier New" panose="02070309020205020404" pitchFamily="49" charset="0"/>
               </a:rPr>
-              <a:t>Indexing: </a:t>
+              <a:t>,  </a:t>
             </a:r>
             <a:r>
               <a:rPr lang="en-GB" dirty="0">
+                <a:solidFill>
+                  <a:srgbClr val="7030A0"/>
+                </a:solidFill>
                 <a:latin typeface="Courier New" panose="02070309020205020404" pitchFamily="49" charset="0"/>
                 <a:cs typeface="Courier New" panose="02070309020205020404" pitchFamily="49" charset="0"/>
               </a:rPr>
-              <a:t>list[index]</a:t>
-            </a:r>
-            <a:r>
-              <a:rPr lang="en-GB" dirty="0">
-                <a:cs typeface="Courier New" panose="02070309020205020404" pitchFamily="49" charset="0"/>
-              </a:rPr>
-              <a:t> e.g. </a:t>
+              <a:t>3*</a:t>
             </a:r>
             <a:r>
               <a:rPr lang="en-GB" dirty="0" err="1">
@@ -14206,6 +13988,40 @@
               </a:rPr>
               <a:t>my_list</a:t>
             </a:r>
+            <a:endParaRPr lang="en-GB" dirty="0">
+              <a:solidFill>
+                <a:srgbClr val="7030A0"/>
+              </a:solidFill>
+              <a:latin typeface="Courier New" panose="02070309020205020404" pitchFamily="49" charset="0"/>
+              <a:cs typeface="Courier New" panose="02070309020205020404" pitchFamily="49" charset="0"/>
+            </a:endParaRPr>
+          </a:p>
+          <a:p>
+            <a:pPr>
+              <a:spcBef>
+                <a:spcPts val="1200"/>
+              </a:spcBef>
+            </a:pPr>
+            <a:r>
+              <a:rPr lang="en-GB" dirty="0">
+                <a:cs typeface="Courier New" panose="02070309020205020404" pitchFamily="49" charset="0"/>
+              </a:rPr>
+              <a:t>Create a list with </a:t>
+            </a:r>
+            <a:r>
+              <a:rPr lang="en-GB" dirty="0">
+                <a:latin typeface="Courier New" panose="02070309020205020404" pitchFamily="49" charset="0"/>
+                <a:cs typeface="Courier New" panose="02070309020205020404" pitchFamily="49" charset="0"/>
+              </a:rPr>
+              <a:t>range</a:t>
+            </a:r>
+            <a:r>
+              <a:rPr lang="en-GB" dirty="0">
+                <a:latin typeface="+mj-lt"/>
+                <a:cs typeface="Courier New" panose="02070309020205020404" pitchFamily="49" charset="0"/>
+              </a:rPr>
+              <a:t> e.g. </a:t>
+            </a:r>
             <a:r>
               <a:rPr lang="en-GB" dirty="0">
                 <a:solidFill>
@@ -14214,13 +14030,57 @@
                 <a:latin typeface="Courier New" panose="02070309020205020404" pitchFamily="49" charset="0"/>
                 <a:cs typeface="Courier New" panose="02070309020205020404" pitchFamily="49" charset="0"/>
               </a:rPr>
-              <a:t>[0]</a:t>
-            </a:r>
+              <a:t>list(range(10))</a:t>
+            </a:r>
+            <a:r>
+              <a:rPr lang="en-GB" dirty="0">
+                <a:latin typeface="+mj-lt"/>
+                <a:cs typeface="Courier New" panose="02070309020205020404" pitchFamily="49" charset="0"/>
+              </a:rPr>
+              <a:t>, </a:t>
+            </a:r>
+            <a:r>
+              <a:rPr lang="en-GB" dirty="0">
+                <a:solidFill>
+                  <a:srgbClr val="7030A0"/>
+                </a:solidFill>
+                <a:latin typeface="Courier New" panose="02070309020205020404" pitchFamily="49" charset="0"/>
+                <a:cs typeface="Courier New" panose="02070309020205020404" pitchFamily="49" charset="0"/>
+              </a:rPr>
+              <a:t>list(range(1,10,2))</a:t>
+            </a:r>
+          </a:p>
+          <a:p>
+            <a:pPr>
+              <a:spcBef>
+                <a:spcPts val="1200"/>
+              </a:spcBef>
+            </a:pPr>
             <a:r>
               <a:rPr lang="en-GB" dirty="0">
                 <a:cs typeface="Courier New" panose="02070309020205020404" pitchFamily="49" charset="0"/>
               </a:rPr>
-              <a:t>, </a:t>
+              <a:t>List functions: </a:t>
+            </a:r>
+            <a:r>
+              <a:rPr lang="en-GB" dirty="0" err="1">
+                <a:solidFill>
+                  <a:srgbClr val="7030A0"/>
+                </a:solidFill>
+                <a:latin typeface="Courier New" panose="02070309020205020404" pitchFamily="49" charset="0"/>
+                <a:cs typeface="Courier New" panose="02070309020205020404" pitchFamily="49" charset="0"/>
+              </a:rPr>
+              <a:t>len</a:t>
+            </a:r>
+            <a:r>
+              <a:rPr lang="en-GB" dirty="0">
+                <a:solidFill>
+                  <a:srgbClr val="7030A0"/>
+                </a:solidFill>
+                <a:latin typeface="Courier New" panose="02070309020205020404" pitchFamily="49" charset="0"/>
+                <a:cs typeface="Courier New" panose="02070309020205020404" pitchFamily="49" charset="0"/>
+              </a:rPr>
+              <a:t>(</a:t>
             </a:r>
             <a:r>
               <a:rPr lang="en-GB" dirty="0" err="1">
@@ -14240,47 +14100,23 @@
                 <a:latin typeface="Courier New" panose="02070309020205020404" pitchFamily="49" charset="0"/>
                 <a:cs typeface="Courier New" panose="02070309020205020404" pitchFamily="49" charset="0"/>
               </a:rPr>
-              <a:t>[-2]</a:t>
-            </a:r>
-          </a:p>
-          <a:p>
-            <a:pPr>
-              <a:spcBef>
-                <a:spcPts val="1200"/>
-              </a:spcBef>
-            </a:pPr>
+              <a:t>)</a:t>
+            </a:r>
             <a:r>
               <a:rPr lang="en-GB" dirty="0">
                 <a:cs typeface="Courier New" panose="02070309020205020404" pitchFamily="49" charset="0"/>
               </a:rPr>
-              <a:t>Slicing: </a:t>
+              <a:t>, </a:t>
             </a:r>
             <a:r>
               <a:rPr lang="en-GB" dirty="0">
+                <a:solidFill>
+                  <a:srgbClr val="7030A0"/>
+                </a:solidFill>
                 <a:latin typeface="Courier New" panose="02070309020205020404" pitchFamily="49" charset="0"/>
                 <a:cs typeface="Courier New" panose="02070309020205020404" pitchFamily="49" charset="0"/>
               </a:rPr>
-              <a:t>list[</a:t>
-            </a:r>
-            <a:r>
-              <a:rPr lang="en-GB" dirty="0" err="1">
-                <a:latin typeface="Courier New" panose="02070309020205020404" pitchFamily="49" charset="0"/>
-                <a:cs typeface="Courier New" panose="02070309020205020404" pitchFamily="49" charset="0"/>
-              </a:rPr>
-              <a:t>start:end</a:t>
-            </a:r>
-            <a:r>
-              <a:rPr lang="en-GB" dirty="0">
-                <a:latin typeface="Courier New" panose="02070309020205020404" pitchFamily="49" charset="0"/>
-                <a:cs typeface="Courier New" panose="02070309020205020404" pitchFamily="49" charset="0"/>
-              </a:rPr>
-              <a:t>]</a:t>
-            </a:r>
-            <a:r>
-              <a:rPr lang="en-GB" dirty="0">
-                <a:cs typeface="Courier New" panose="02070309020205020404" pitchFamily="49" charset="0"/>
-              </a:rPr>
-              <a:t> e.g. </a:t>
+              <a:t>sorted(</a:t>
             </a:r>
             <a:r>
               <a:rPr lang="en-GB" dirty="0" err="1">
@@ -14300,13 +14136,20 @@
                 <a:latin typeface="Courier New" panose="02070309020205020404" pitchFamily="49" charset="0"/>
                 <a:cs typeface="Courier New" panose="02070309020205020404" pitchFamily="49" charset="0"/>
               </a:rPr>
-              <a:t>[1:3]</a:t>
-            </a:r>
+              <a:t>)</a:t>
+            </a:r>
+          </a:p>
+          <a:p>
+            <a:pPr>
+              <a:spcBef>
+                <a:spcPts val="1200"/>
+              </a:spcBef>
+            </a:pPr>
             <a:r>
               <a:rPr lang="en-GB" dirty="0">
                 <a:cs typeface="Courier New" panose="02070309020205020404" pitchFamily="49" charset="0"/>
               </a:rPr>
-              <a:t>, </a:t>
+              <a:t>List methods: </a:t>
             </a:r>
             <a:r>
               <a:rPr lang="en-GB" dirty="0" err="1">
@@ -14316,7 +14159,7 @@
                 <a:latin typeface="Courier New" panose="02070309020205020404" pitchFamily="49" charset="0"/>
                 <a:cs typeface="Courier New" panose="02070309020205020404" pitchFamily="49" charset="0"/>
               </a:rPr>
-              <a:t>my_list</a:t>
+              <a:t>my_list.append</a:t>
             </a:r>
             <a:r>
               <a:rPr lang="en-GB" dirty="0">
@@ -14326,7 +14169,7 @@
                 <a:latin typeface="Courier New" panose="02070309020205020404" pitchFamily="49" charset="0"/>
                 <a:cs typeface="Courier New" panose="02070309020205020404" pitchFamily="49" charset="0"/>
               </a:rPr>
-              <a:t>[:-2]</a:t>
+              <a:t>(‘a’)</a:t>
             </a:r>
             <a:r>
               <a:rPr lang="en-GB" dirty="0">
@@ -14342,7 +14185,7 @@
                 <a:latin typeface="Courier New" panose="02070309020205020404" pitchFamily="49" charset="0"/>
                 <a:cs typeface="Courier New" panose="02070309020205020404" pitchFamily="49" charset="0"/>
               </a:rPr>
-              <a:t>my_list</a:t>
+              <a:t>my_list.insert</a:t>
             </a:r>
             <a:r>
               <a:rPr lang="en-GB" dirty="0">
@@ -14352,54 +14195,23 @@
                 <a:latin typeface="Courier New" panose="02070309020205020404" pitchFamily="49" charset="0"/>
                 <a:cs typeface="Courier New" panose="02070309020205020404" pitchFamily="49" charset="0"/>
               </a:rPr>
-              <a:t>[:]</a:t>
-            </a:r>
-            <a:r>
-              <a:rPr lang="en-GB" dirty="0">
-                <a:latin typeface="+mj-lt"/>
-                <a:cs typeface="Courier New" panose="02070309020205020404" pitchFamily="49" charset="0"/>
-              </a:rPr>
-              <a:t> (copy the whole list)</a:t>
-            </a:r>
-          </a:p>
-          <a:p>
-            <a:pPr>
-              <a:spcBef>
-                <a:spcPts val="1200"/>
-              </a:spcBef>
-            </a:pPr>
+              <a:t>(0, 35)</a:t>
+            </a:r>
             <a:r>
               <a:rPr lang="en-GB" dirty="0">
                 <a:cs typeface="Courier New" panose="02070309020205020404" pitchFamily="49" charset="0"/>
               </a:rPr>
-              <a:t>More complex slicing: </a:t>
+              <a:t>, </a:t>
             </a:r>
             <a:r>
               <a:rPr lang="en-GB" dirty="0">
+                <a:solidFill>
+                  <a:srgbClr val="7030A0"/>
+                </a:solidFill>
                 <a:latin typeface="Courier New" panose="02070309020205020404" pitchFamily="49" charset="0"/>
                 <a:cs typeface="Courier New" panose="02070309020205020404" pitchFamily="49" charset="0"/>
               </a:rPr>
-              <a:t>list[</a:t>
-            </a:r>
-            <a:r>
-              <a:rPr lang="en-GB" dirty="0" err="1">
-                <a:latin typeface="Courier New" panose="02070309020205020404" pitchFamily="49" charset="0"/>
-                <a:cs typeface="Courier New" panose="02070309020205020404" pitchFamily="49" charset="0"/>
-              </a:rPr>
-              <a:t>start:end:step</a:t>
-            </a:r>
-            <a:r>
-              <a:rPr lang="en-GB" dirty="0">
-                <a:latin typeface="Courier New" panose="02070309020205020404" pitchFamily="49" charset="0"/>
-                <a:cs typeface="Courier New" panose="02070309020205020404" pitchFamily="49" charset="0"/>
-              </a:rPr>
-              <a:t>]</a:t>
-            </a:r>
-            <a:r>
-              <a:rPr lang="en-GB" dirty="0">
-                <a:cs typeface="Courier New" panose="02070309020205020404" pitchFamily="49" charset="0"/>
-              </a:rPr>
-              <a:t> e.g. </a:t>
+              <a:t> </a:t>
             </a:r>
             <a:r>
               <a:rPr lang="en-GB" dirty="0" err="1">
@@ -14409,7 +14221,7 @@
                 <a:latin typeface="Courier New" panose="02070309020205020404" pitchFamily="49" charset="0"/>
                 <a:cs typeface="Courier New" panose="02070309020205020404" pitchFamily="49" charset="0"/>
               </a:rPr>
-              <a:t>my_list</a:t>
+              <a:t>my_list.pop</a:t>
             </a:r>
             <a:r>
               <a:rPr lang="en-GB" dirty="0">
@@ -14419,7 +14231,7 @@
                 <a:latin typeface="Courier New" panose="02070309020205020404" pitchFamily="49" charset="0"/>
                 <a:cs typeface="Courier New" panose="02070309020205020404" pitchFamily="49" charset="0"/>
               </a:rPr>
-              <a:t>[1::2]</a:t>
+              <a:t>(2)</a:t>
             </a:r>
             <a:r>
               <a:rPr lang="en-GB" dirty="0">
@@ -14435,7 +14247,7 @@
                 <a:latin typeface="Courier New" panose="02070309020205020404" pitchFamily="49" charset="0"/>
                 <a:cs typeface="Courier New" panose="02070309020205020404" pitchFamily="49" charset="0"/>
               </a:rPr>
-              <a:t>my_list</a:t>
+              <a:t>my_list.remove</a:t>
             </a:r>
             <a:r>
               <a:rPr lang="en-GB" dirty="0">
@@ -14445,17 +14257,42 @@
                 <a:latin typeface="Courier New" panose="02070309020205020404" pitchFamily="49" charset="0"/>
                 <a:cs typeface="Courier New" panose="02070309020205020404" pitchFamily="49" charset="0"/>
               </a:rPr>
-              <a:t>[::-1]</a:t>
+              <a:t>(‘a’)</a:t>
             </a:r>
             <a:r>
               <a:rPr lang="en-GB" dirty="0">
-                <a:latin typeface="+mj-lt"/>
                 <a:cs typeface="Courier New" panose="02070309020205020404" pitchFamily="49" charset="0"/>
               </a:rPr>
-              <a:t> (reverse the list)</a:t>
-            </a:r>
+              <a:t>, </a:t>
+            </a:r>
+            <a:r>
+              <a:rPr lang="en-GB" dirty="0" err="1">
+                <a:solidFill>
+                  <a:srgbClr val="7030A0"/>
+                </a:solidFill>
+                <a:latin typeface="Courier New" panose="02070309020205020404" pitchFamily="49" charset="0"/>
+                <a:cs typeface="Courier New" panose="02070309020205020404" pitchFamily="49" charset="0"/>
+              </a:rPr>
+              <a:t>my_list.index</a:t>
+            </a:r>
+            <a:r>
+              <a:rPr lang="en-GB" dirty="0">
+                <a:solidFill>
+                  <a:srgbClr val="7030A0"/>
+                </a:solidFill>
+                <a:latin typeface="Courier New" panose="02070309020205020404" pitchFamily="49" charset="0"/>
+                <a:cs typeface="Courier New" panose="02070309020205020404" pitchFamily="49" charset="0"/>
+              </a:rPr>
+              <a:t>(35)</a:t>
+            </a:r>
+          </a:p>
+          <a:p>
+            <a:pPr>
+              <a:spcBef>
+                <a:spcPts val="1200"/>
+              </a:spcBef>
+            </a:pPr>
             <a:endParaRPr lang="en-GB" dirty="0">
-              <a:latin typeface="Courier New" panose="02070309020205020404" pitchFamily="49" charset="0"/>
               <a:cs typeface="Courier New" panose="02070309020205020404" pitchFamily="49" charset="0"/>
             </a:endParaRPr>
           </a:p>
@@ -14484,10 +14321,104 @@
           </a:p>
         </p:txBody>
       </p:sp>
+      <p:sp>
+        <p:nvSpPr>
+          <p:cNvPr id="5" name="TextBox 4"/>
+          <p:cNvSpPr txBox="1"/>
+          <p:nvPr/>
+        </p:nvSpPr>
+        <p:spPr>
+          <a:xfrm>
+            <a:off x="5571242" y="755370"/>
+            <a:ext cx="5476170" cy="1015663"/>
+          </a:xfrm>
+          <a:prstGeom prst="rect">
+            <a:avLst/>
+          </a:prstGeom>
+          <a:noFill/>
+        </p:spPr>
+        <p:txBody>
+          <a:bodyPr wrap="square" rtlCol="0">
+            <a:spAutoFit/>
+          </a:bodyPr>
+          <a:lstStyle/>
+          <a:p>
+            <a:pPr algn="ctr"/>
+            <a:r>
+              <a:rPr lang="en-GB" sz="2000" dirty="0">
+                <a:cs typeface="Courier New" panose="02070309020205020404" pitchFamily="49" charset="0"/>
+              </a:rPr>
+              <a:t>Type help([function/object]) in the shell to see information about how to use the function/object, e.g. </a:t>
+            </a:r>
+            <a:r>
+              <a:rPr lang="en-GB" sz="2000" dirty="0">
+                <a:solidFill>
+                  <a:srgbClr val="7030A0"/>
+                </a:solidFill>
+                <a:latin typeface="Courier New" panose="02070309020205020404" pitchFamily="49" charset="0"/>
+                <a:cs typeface="Courier New" panose="02070309020205020404" pitchFamily="49" charset="0"/>
+              </a:rPr>
+              <a:t>help(range)</a:t>
+            </a:r>
+            <a:r>
+              <a:rPr lang="en-GB" sz="2000" dirty="0">
+                <a:cs typeface="Courier New" panose="02070309020205020404" pitchFamily="49" charset="0"/>
+              </a:rPr>
+              <a:t>, </a:t>
+            </a:r>
+            <a:r>
+              <a:rPr lang="en-GB" sz="2000" dirty="0">
+                <a:solidFill>
+                  <a:srgbClr val="7030A0"/>
+                </a:solidFill>
+                <a:latin typeface="Courier New" panose="02070309020205020404" pitchFamily="49" charset="0"/>
+                <a:cs typeface="Courier New" panose="02070309020205020404" pitchFamily="49" charset="0"/>
+              </a:rPr>
+              <a:t>help(</a:t>
+            </a:r>
+            <a:r>
+              <a:rPr lang="en-GB" sz="2000" dirty="0" err="1">
+                <a:solidFill>
+                  <a:srgbClr val="7030A0"/>
+                </a:solidFill>
+                <a:latin typeface="Courier New" panose="02070309020205020404" pitchFamily="49" charset="0"/>
+                <a:cs typeface="Courier New" panose="02070309020205020404" pitchFamily="49" charset="0"/>
+              </a:rPr>
+              <a:t>len</a:t>
+            </a:r>
+            <a:r>
+              <a:rPr lang="en-GB" sz="2000" dirty="0">
+                <a:solidFill>
+                  <a:srgbClr val="7030A0"/>
+                </a:solidFill>
+                <a:latin typeface="Courier New" panose="02070309020205020404" pitchFamily="49" charset="0"/>
+                <a:cs typeface="Courier New" panose="02070309020205020404" pitchFamily="49" charset="0"/>
+              </a:rPr>
+              <a:t>)</a:t>
+            </a:r>
+            <a:r>
+              <a:rPr lang="en-GB" sz="2000" dirty="0">
+                <a:cs typeface="Courier New" panose="02070309020205020404" pitchFamily="49" charset="0"/>
+              </a:rPr>
+              <a:t>, </a:t>
+            </a:r>
+            <a:r>
+              <a:rPr lang="en-GB" sz="2000" dirty="0">
+                <a:solidFill>
+                  <a:srgbClr val="7030A0"/>
+                </a:solidFill>
+                <a:latin typeface="Courier New" panose="02070309020205020404" pitchFamily="49" charset="0"/>
+                <a:cs typeface="Courier New" panose="02070309020205020404" pitchFamily="49" charset="0"/>
+              </a:rPr>
+              <a:t>help(list)</a:t>
+            </a:r>
+          </a:p>
+        </p:txBody>
+      </p:sp>
     </p:spTree>
     <p:extLst>
       <p:ext uri="{BB962C8B-B14F-4D97-AF65-F5344CB8AC3E}">
-        <p14:creationId xmlns:p14="http://schemas.microsoft.com/office/powerpoint/2010/main" val="2167833124"/>
+        <p14:creationId xmlns:p14="http://schemas.microsoft.com/office/powerpoint/2010/main" val="3124918447"/>
       </p:ext>
     </p:extLst>
   </p:cSld>
@@ -14530,8 +14461,15 @@
           <a:lstStyle/>
           <a:p>
             <a:r>
+              <a:rPr lang="en-GB" dirty="0">
+                <a:latin typeface="+mn-lt"/>
+                <a:cs typeface="Courier New" panose="02070309020205020404" pitchFamily="49" charset="0"/>
+              </a:rPr>
+              <a:t>If</a:t>
+            </a:r>
+            <a:r>
               <a:rPr lang="en-GB" dirty="0"/>
-              <a:t>List Operations</a:t>
+              <a:t> Statements</a:t>
             </a:r>
           </a:p>
         </p:txBody>
@@ -14547,31 +14485,74 @@
           </p:nvPr>
         </p:nvSpPr>
         <p:spPr>
-          <a:xfrm>
-            <a:off x="1141412" y="2097088"/>
-            <a:ext cx="9905999" cy="3669531"/>
-          </a:xfrm>
           <a:solidFill>
             <a:srgbClr val="36AAC5"/>
           </a:solidFill>
         </p:spPr>
         <p:txBody>
-          <a:bodyPr numCol="1">
-            <a:normAutofit/>
+          <a:bodyPr numCol="2">
+            <a:normAutofit lnSpcReduction="10000"/>
           </a:bodyPr>
           <a:lstStyle/>
           <a:p>
-            <a:pPr>
+            <a:pPr marL="0" indent="0">
               <a:spcBef>
-                <a:spcPts val="1200"/>
+                <a:spcPts val="0"/>
               </a:spcBef>
+              <a:buNone/>
             </a:pPr>
             <a:r>
               <a:rPr lang="en-GB" dirty="0">
+                <a:solidFill>
+                  <a:srgbClr val="7030A0"/>
+                </a:solidFill>
+                <a:latin typeface="Courier New" panose="02070309020205020404" pitchFamily="49" charset="0"/>
                 <a:cs typeface="Courier New" panose="02070309020205020404" pitchFamily="49" charset="0"/>
               </a:rPr>
-              <a:t>Addition, multiplication: </a:t>
-            </a:r>
+              <a:t>if </a:t>
+            </a:r>
+            <a:r>
+              <a:rPr lang="en-GB" dirty="0">
+                <a:solidFill>
+                  <a:srgbClr val="7030A0"/>
+                </a:solidFill>
+              </a:rPr>
+              <a:t>[condition]</a:t>
+            </a:r>
+            <a:r>
+              <a:rPr lang="en-GB" dirty="0">
+                <a:solidFill>
+                  <a:srgbClr val="7030A0"/>
+                </a:solidFill>
+                <a:latin typeface="Courier New" panose="02070309020205020404" pitchFamily="49" charset="0"/>
+                <a:cs typeface="Courier New" panose="02070309020205020404" pitchFamily="49" charset="0"/>
+              </a:rPr>
+              <a:t>:</a:t>
+            </a:r>
+          </a:p>
+          <a:p>
+            <a:pPr marL="0" indent="0">
+              <a:spcBef>
+                <a:spcPts val="0"/>
+              </a:spcBef>
+              <a:buNone/>
+            </a:pPr>
+            <a:r>
+              <a:rPr lang="en-GB" dirty="0">
+                <a:solidFill>
+                  <a:srgbClr val="7030A0"/>
+                </a:solidFill>
+              </a:rPr>
+              <a:t>    [do this]</a:t>
+            </a:r>
+          </a:p>
+          <a:p>
+            <a:pPr marL="0" indent="0">
+              <a:spcBef>
+                <a:spcPts val="0"/>
+              </a:spcBef>
+              <a:buNone/>
+            </a:pPr>
             <a:r>
               <a:rPr lang="en-GB" dirty="0" err="1">
                 <a:solidFill>
@@ -14580,258 +14561,7 @@
                 <a:latin typeface="Courier New" panose="02070309020205020404" pitchFamily="49" charset="0"/>
                 <a:cs typeface="Courier New" panose="02070309020205020404" pitchFamily="49" charset="0"/>
               </a:rPr>
-              <a:t>my_list</a:t>
-            </a:r>
-            <a:r>
-              <a:rPr lang="en-GB" dirty="0">
-                <a:solidFill>
-                  <a:srgbClr val="7030A0"/>
-                </a:solidFill>
-                <a:latin typeface="Courier New" panose="02070309020205020404" pitchFamily="49" charset="0"/>
-                <a:cs typeface="Courier New" panose="02070309020205020404" pitchFamily="49" charset="0"/>
-              </a:rPr>
-              <a:t>+[1, 2]</a:t>
-            </a:r>
-            <a:r>
-              <a:rPr lang="en-GB" dirty="0">
-                <a:cs typeface="Courier New" panose="02070309020205020404" pitchFamily="49" charset="0"/>
-              </a:rPr>
-              <a:t>,  </a:t>
-            </a:r>
-            <a:r>
-              <a:rPr lang="en-GB" dirty="0">
-                <a:solidFill>
-                  <a:srgbClr val="7030A0"/>
-                </a:solidFill>
-                <a:latin typeface="Courier New" panose="02070309020205020404" pitchFamily="49" charset="0"/>
-                <a:cs typeface="Courier New" panose="02070309020205020404" pitchFamily="49" charset="0"/>
-              </a:rPr>
-              <a:t>3*</a:t>
-            </a:r>
-            <a:r>
-              <a:rPr lang="en-GB" dirty="0" err="1">
-                <a:solidFill>
-                  <a:srgbClr val="7030A0"/>
-                </a:solidFill>
-                <a:latin typeface="Courier New" panose="02070309020205020404" pitchFamily="49" charset="0"/>
-                <a:cs typeface="Courier New" panose="02070309020205020404" pitchFamily="49" charset="0"/>
-              </a:rPr>
-              <a:t>my_list</a:t>
-            </a:r>
-            <a:endParaRPr lang="en-GB" dirty="0">
-              <a:solidFill>
-                <a:srgbClr val="7030A0"/>
-              </a:solidFill>
-              <a:latin typeface="Courier New" panose="02070309020205020404" pitchFamily="49" charset="0"/>
-              <a:cs typeface="Courier New" panose="02070309020205020404" pitchFamily="49" charset="0"/>
-            </a:endParaRPr>
-          </a:p>
-          <a:p>
-            <a:pPr>
-              <a:spcBef>
-                <a:spcPts val="1200"/>
-              </a:spcBef>
-            </a:pPr>
-            <a:r>
-              <a:rPr lang="en-GB" dirty="0">
-                <a:cs typeface="Courier New" panose="02070309020205020404" pitchFamily="49" charset="0"/>
-              </a:rPr>
-              <a:t>Create a list with </a:t>
-            </a:r>
-            <a:r>
-              <a:rPr lang="en-GB" dirty="0">
-                <a:latin typeface="Courier New" panose="02070309020205020404" pitchFamily="49" charset="0"/>
-                <a:cs typeface="Courier New" panose="02070309020205020404" pitchFamily="49" charset="0"/>
-              </a:rPr>
-              <a:t>range</a:t>
-            </a:r>
-            <a:r>
-              <a:rPr lang="en-GB" dirty="0">
-                <a:latin typeface="+mj-lt"/>
-                <a:cs typeface="Courier New" panose="02070309020205020404" pitchFamily="49" charset="0"/>
-              </a:rPr>
-              <a:t> e.g. </a:t>
-            </a:r>
-            <a:r>
-              <a:rPr lang="en-GB" dirty="0">
-                <a:solidFill>
-                  <a:srgbClr val="7030A0"/>
-                </a:solidFill>
-                <a:latin typeface="Courier New" panose="02070309020205020404" pitchFamily="49" charset="0"/>
-                <a:cs typeface="Courier New" panose="02070309020205020404" pitchFamily="49" charset="0"/>
-              </a:rPr>
-              <a:t>list(range(10))</a:t>
-            </a:r>
-            <a:r>
-              <a:rPr lang="en-GB" dirty="0">
-                <a:latin typeface="+mj-lt"/>
-                <a:cs typeface="Courier New" panose="02070309020205020404" pitchFamily="49" charset="0"/>
-              </a:rPr>
-              <a:t>, </a:t>
-            </a:r>
-            <a:r>
-              <a:rPr lang="en-GB" dirty="0">
-                <a:solidFill>
-                  <a:srgbClr val="7030A0"/>
-                </a:solidFill>
-                <a:latin typeface="Courier New" panose="02070309020205020404" pitchFamily="49" charset="0"/>
-                <a:cs typeface="Courier New" panose="02070309020205020404" pitchFamily="49" charset="0"/>
-              </a:rPr>
-              <a:t>list(range(1,10,2))</a:t>
-            </a:r>
-          </a:p>
-          <a:p>
-            <a:pPr>
-              <a:spcBef>
-                <a:spcPts val="1200"/>
-              </a:spcBef>
-            </a:pPr>
-            <a:r>
-              <a:rPr lang="en-GB" dirty="0">
-                <a:cs typeface="Courier New" panose="02070309020205020404" pitchFamily="49" charset="0"/>
-              </a:rPr>
-              <a:t>List functions: </a:t>
-            </a:r>
-            <a:r>
-              <a:rPr lang="en-GB" dirty="0" err="1">
-                <a:solidFill>
-                  <a:srgbClr val="7030A0"/>
-                </a:solidFill>
-                <a:latin typeface="Courier New" panose="02070309020205020404" pitchFamily="49" charset="0"/>
-                <a:cs typeface="Courier New" panose="02070309020205020404" pitchFamily="49" charset="0"/>
-              </a:rPr>
-              <a:t>len</a:t>
-            </a:r>
-            <a:r>
-              <a:rPr lang="en-GB" dirty="0">
-                <a:solidFill>
-                  <a:srgbClr val="7030A0"/>
-                </a:solidFill>
-                <a:latin typeface="Courier New" panose="02070309020205020404" pitchFamily="49" charset="0"/>
-                <a:cs typeface="Courier New" panose="02070309020205020404" pitchFamily="49" charset="0"/>
-              </a:rPr>
-              <a:t>(</a:t>
-            </a:r>
-            <a:r>
-              <a:rPr lang="en-GB" dirty="0" err="1">
-                <a:solidFill>
-                  <a:srgbClr val="7030A0"/>
-                </a:solidFill>
-                <a:latin typeface="Courier New" panose="02070309020205020404" pitchFamily="49" charset="0"/>
-                <a:cs typeface="Courier New" panose="02070309020205020404" pitchFamily="49" charset="0"/>
-              </a:rPr>
-              <a:t>my_list</a:t>
-            </a:r>
-            <a:r>
-              <a:rPr lang="en-GB" dirty="0">
-                <a:solidFill>
-                  <a:srgbClr val="7030A0"/>
-                </a:solidFill>
-                <a:latin typeface="Courier New" panose="02070309020205020404" pitchFamily="49" charset="0"/>
-                <a:cs typeface="Courier New" panose="02070309020205020404" pitchFamily="49" charset="0"/>
-              </a:rPr>
-              <a:t>)</a:t>
-            </a:r>
-            <a:r>
-              <a:rPr lang="en-GB" dirty="0">
-                <a:cs typeface="Courier New" panose="02070309020205020404" pitchFamily="49" charset="0"/>
-              </a:rPr>
-              <a:t>, </a:t>
-            </a:r>
-            <a:r>
-              <a:rPr lang="en-GB" dirty="0">
-                <a:solidFill>
-                  <a:srgbClr val="7030A0"/>
-                </a:solidFill>
-                <a:latin typeface="Courier New" panose="02070309020205020404" pitchFamily="49" charset="0"/>
-                <a:cs typeface="Courier New" panose="02070309020205020404" pitchFamily="49" charset="0"/>
-              </a:rPr>
-              <a:t>sorted(</a:t>
-            </a:r>
-            <a:r>
-              <a:rPr lang="en-GB" dirty="0" err="1">
-                <a:solidFill>
-                  <a:srgbClr val="7030A0"/>
-                </a:solidFill>
-                <a:latin typeface="Courier New" panose="02070309020205020404" pitchFamily="49" charset="0"/>
-                <a:cs typeface="Courier New" panose="02070309020205020404" pitchFamily="49" charset="0"/>
-              </a:rPr>
-              <a:t>my_list</a:t>
-            </a:r>
-            <a:r>
-              <a:rPr lang="en-GB" dirty="0">
-                <a:solidFill>
-                  <a:srgbClr val="7030A0"/>
-                </a:solidFill>
-                <a:latin typeface="Courier New" panose="02070309020205020404" pitchFamily="49" charset="0"/>
-                <a:cs typeface="Courier New" panose="02070309020205020404" pitchFamily="49" charset="0"/>
-              </a:rPr>
-              <a:t>)</a:t>
-            </a:r>
-          </a:p>
-          <a:p>
-            <a:pPr>
-              <a:spcBef>
-                <a:spcPts val="1200"/>
-              </a:spcBef>
-            </a:pPr>
-            <a:r>
-              <a:rPr lang="en-GB" dirty="0">
-                <a:cs typeface="Courier New" panose="02070309020205020404" pitchFamily="49" charset="0"/>
-              </a:rPr>
-              <a:t>List methods: </a:t>
-            </a:r>
-            <a:r>
-              <a:rPr lang="en-GB" dirty="0" err="1">
-                <a:solidFill>
-                  <a:srgbClr val="7030A0"/>
-                </a:solidFill>
-                <a:latin typeface="Courier New" panose="02070309020205020404" pitchFamily="49" charset="0"/>
-                <a:cs typeface="Courier New" panose="02070309020205020404" pitchFamily="49" charset="0"/>
-              </a:rPr>
-              <a:t>my_list.append</a:t>
-            </a:r>
-            <a:r>
-              <a:rPr lang="en-GB" dirty="0">
-                <a:solidFill>
-                  <a:srgbClr val="7030A0"/>
-                </a:solidFill>
-                <a:latin typeface="Courier New" panose="02070309020205020404" pitchFamily="49" charset="0"/>
-                <a:cs typeface="Courier New" panose="02070309020205020404" pitchFamily="49" charset="0"/>
-              </a:rPr>
-              <a:t>(‘a’)</a:t>
-            </a:r>
-            <a:r>
-              <a:rPr lang="en-GB" dirty="0">
-                <a:cs typeface="Courier New" panose="02070309020205020404" pitchFamily="49" charset="0"/>
-              </a:rPr>
-              <a:t>, </a:t>
-            </a:r>
-            <a:r>
-              <a:rPr lang="en-GB" dirty="0" err="1">
-                <a:solidFill>
-                  <a:srgbClr val="7030A0"/>
-                </a:solidFill>
-                <a:latin typeface="Courier New" panose="02070309020205020404" pitchFamily="49" charset="0"/>
-                <a:cs typeface="Courier New" panose="02070309020205020404" pitchFamily="49" charset="0"/>
-              </a:rPr>
-              <a:t>my_list.insert</a:t>
-            </a:r>
-            <a:r>
-              <a:rPr lang="en-GB" dirty="0">
-                <a:solidFill>
-                  <a:srgbClr val="7030A0"/>
-                </a:solidFill>
-                <a:latin typeface="Courier New" panose="02070309020205020404" pitchFamily="49" charset="0"/>
-                <a:cs typeface="Courier New" panose="02070309020205020404" pitchFamily="49" charset="0"/>
-              </a:rPr>
-              <a:t>(0, 35)</a:t>
-            </a:r>
-            <a:r>
-              <a:rPr lang="en-GB" dirty="0">
-                <a:cs typeface="Courier New" panose="02070309020205020404" pitchFamily="49" charset="0"/>
-              </a:rPr>
-              <a:t>, </a:t>
+              <a:t>elif</a:t>
             </a:r>
             <a:r>
               <a:rPr lang="en-GB" dirty="0">
@@ -14844,6 +14574,173 @@
               <a:t> </a:t>
             </a:r>
             <a:r>
+              <a:rPr lang="en-GB" dirty="0">
+                <a:solidFill>
+                  <a:srgbClr val="7030A0"/>
+                </a:solidFill>
+              </a:rPr>
+              <a:t>[condition]</a:t>
+            </a:r>
+            <a:r>
+              <a:rPr lang="en-GB" dirty="0">
+                <a:solidFill>
+                  <a:srgbClr val="7030A0"/>
+                </a:solidFill>
+                <a:latin typeface="Courier New" panose="02070309020205020404" pitchFamily="49" charset="0"/>
+                <a:cs typeface="Courier New" panose="02070309020205020404" pitchFamily="49" charset="0"/>
+              </a:rPr>
+              <a:t>: </a:t>
+            </a:r>
+            <a:r>
+              <a:rPr lang="en-GB" dirty="0"/>
+              <a:t>(optional)</a:t>
+            </a:r>
+          </a:p>
+          <a:p>
+            <a:pPr marL="0" indent="0">
+              <a:spcBef>
+                <a:spcPts val="0"/>
+              </a:spcBef>
+              <a:buNone/>
+            </a:pPr>
+            <a:r>
+              <a:rPr lang="en-GB" dirty="0">
+                <a:solidFill>
+                  <a:srgbClr val="7030A0"/>
+                </a:solidFill>
+              </a:rPr>
+              <a:t>    [do this]</a:t>
+            </a:r>
+          </a:p>
+          <a:p>
+            <a:pPr marL="0" indent="0">
+              <a:spcBef>
+                <a:spcPts val="0"/>
+              </a:spcBef>
+              <a:buNone/>
+            </a:pPr>
+            <a:r>
+              <a:rPr lang="en-GB" dirty="0">
+                <a:solidFill>
+                  <a:srgbClr val="7030A0"/>
+                </a:solidFill>
+              </a:rPr>
+              <a:t>    [and this]</a:t>
+            </a:r>
+          </a:p>
+          <a:p>
+            <a:pPr marL="0" indent="0">
+              <a:spcBef>
+                <a:spcPts val="0"/>
+              </a:spcBef>
+              <a:buNone/>
+            </a:pPr>
+            <a:r>
+              <a:rPr lang="en-GB" dirty="0">
+                <a:solidFill>
+                  <a:srgbClr val="7030A0"/>
+                </a:solidFill>
+                <a:latin typeface="Courier New" panose="02070309020205020404" pitchFamily="49" charset="0"/>
+                <a:cs typeface="Courier New" panose="02070309020205020404" pitchFamily="49" charset="0"/>
+              </a:rPr>
+              <a:t>else: </a:t>
+            </a:r>
+            <a:r>
+              <a:rPr lang="en-GB" dirty="0"/>
+              <a:t>(optional)</a:t>
+            </a:r>
+          </a:p>
+          <a:p>
+            <a:pPr marL="0" indent="0">
+              <a:spcBef>
+                <a:spcPts val="0"/>
+              </a:spcBef>
+              <a:buNone/>
+            </a:pPr>
+            <a:r>
+              <a:rPr lang="en-GB" dirty="0">
+                <a:solidFill>
+                  <a:srgbClr val="7030A0"/>
+                </a:solidFill>
+              </a:rPr>
+              <a:t>    [do this]</a:t>
+            </a:r>
+          </a:p>
+          <a:p>
+            <a:pPr marL="0" indent="0">
+              <a:spcBef>
+                <a:spcPts val="0"/>
+              </a:spcBef>
+              <a:buNone/>
+            </a:pPr>
+            <a:endParaRPr lang="en-GB" dirty="0">
+              <a:solidFill>
+                <a:srgbClr val="7030A0"/>
+              </a:solidFill>
+            </a:endParaRPr>
+          </a:p>
+          <a:p>
+            <a:pPr marL="0" indent="0">
+              <a:spcBef>
+                <a:spcPts val="0"/>
+              </a:spcBef>
+              <a:buNone/>
+            </a:pPr>
+            <a:r>
+              <a:rPr lang="en-GB" dirty="0">
+                <a:solidFill>
+                  <a:srgbClr val="7030A0"/>
+                </a:solidFill>
+                <a:latin typeface="Courier New" panose="02070309020205020404" pitchFamily="49" charset="0"/>
+                <a:cs typeface="Courier New" panose="02070309020205020404" pitchFamily="49" charset="0"/>
+              </a:rPr>
+              <a:t>x = 1</a:t>
+            </a:r>
+          </a:p>
+          <a:p>
+            <a:pPr marL="0" indent="0">
+              <a:spcBef>
+                <a:spcPts val="0"/>
+              </a:spcBef>
+              <a:buNone/>
+            </a:pPr>
+            <a:r>
+              <a:rPr lang="en-GB" dirty="0">
+                <a:solidFill>
+                  <a:srgbClr val="7030A0"/>
+                </a:solidFill>
+                <a:latin typeface="Courier New" panose="02070309020205020404" pitchFamily="49" charset="0"/>
+                <a:cs typeface="Courier New" panose="02070309020205020404" pitchFamily="49" charset="0"/>
+              </a:rPr>
+              <a:t>if x &gt; 0:</a:t>
+            </a:r>
+          </a:p>
+          <a:p>
+            <a:pPr marL="0" indent="0">
+              <a:spcBef>
+                <a:spcPts val="0"/>
+              </a:spcBef>
+              <a:buNone/>
+            </a:pPr>
+            <a:r>
+              <a:rPr lang="en-GB" dirty="0">
+                <a:solidFill>
+                  <a:srgbClr val="7030A0"/>
+                </a:solidFill>
+                <a:latin typeface="Courier New" panose="02070309020205020404" pitchFamily="49" charset="0"/>
+                <a:cs typeface="Courier New" panose="02070309020205020404" pitchFamily="49" charset="0"/>
+              </a:rPr>
+              <a:t>    print(“Positive”)</a:t>
+            </a:r>
+          </a:p>
+          <a:p>
+            <a:pPr marL="0" indent="0">
+              <a:spcBef>
+                <a:spcPts val="0"/>
+              </a:spcBef>
+              <a:buNone/>
+            </a:pPr>
+            <a:r>
               <a:rPr lang="en-GB" dirty="0" err="1">
                 <a:solidFill>
                   <a:srgbClr val="7030A0"/>
@@ -14851,7 +14748,7 @@
                 <a:latin typeface="Courier New" panose="02070309020205020404" pitchFamily="49" charset="0"/>
                 <a:cs typeface="Courier New" panose="02070309020205020404" pitchFamily="49" charset="0"/>
               </a:rPr>
-              <a:t>my_list.pop</a:t>
+              <a:t>elif</a:t>
             </a:r>
             <a:r>
               <a:rPr lang="en-GB" dirty="0">
@@ -14861,24 +14758,16 @@
                 <a:latin typeface="Courier New" panose="02070309020205020404" pitchFamily="49" charset="0"/>
                 <a:cs typeface="Courier New" panose="02070309020205020404" pitchFamily="49" charset="0"/>
               </a:rPr>
-              <a:t>(2)</a:t>
-            </a:r>
-            <a:r>
-              <a:rPr lang="en-GB" dirty="0">
-                <a:cs typeface="Courier New" panose="02070309020205020404" pitchFamily="49" charset="0"/>
-              </a:rPr>
-              <a:t>, </a:t>
-            </a:r>
-            <a:r>
-              <a:rPr lang="en-GB" dirty="0" err="1">
-                <a:solidFill>
-                  <a:srgbClr val="7030A0"/>
-                </a:solidFill>
-                <a:latin typeface="Courier New" panose="02070309020205020404" pitchFamily="49" charset="0"/>
-                <a:cs typeface="Courier New" panose="02070309020205020404" pitchFamily="49" charset="0"/>
-              </a:rPr>
-              <a:t>my_list.remove</a:t>
-            </a:r>
+              <a:t> x == 0:</a:t>
+            </a:r>
+          </a:p>
+          <a:p>
+            <a:pPr marL="0" indent="0">
+              <a:spcBef>
+                <a:spcPts val="0"/>
+              </a:spcBef>
+              <a:buNone/>
+            </a:pPr>
             <a:r>
               <a:rPr lang="en-GB" dirty="0">
                 <a:solidFill>
@@ -14887,24 +14776,16 @@
                 <a:latin typeface="Courier New" panose="02070309020205020404" pitchFamily="49" charset="0"/>
                 <a:cs typeface="Courier New" panose="02070309020205020404" pitchFamily="49" charset="0"/>
               </a:rPr>
-              <a:t>(‘a’)</a:t>
-            </a:r>
-            <a:r>
-              <a:rPr lang="en-GB" dirty="0">
-                <a:cs typeface="Courier New" panose="02070309020205020404" pitchFamily="49" charset="0"/>
-              </a:rPr>
-              <a:t>, </a:t>
-            </a:r>
-            <a:r>
-              <a:rPr lang="en-GB" dirty="0" err="1">
-                <a:solidFill>
-                  <a:srgbClr val="7030A0"/>
-                </a:solidFill>
-                <a:latin typeface="Courier New" panose="02070309020205020404" pitchFamily="49" charset="0"/>
-                <a:cs typeface="Courier New" panose="02070309020205020404" pitchFamily="49" charset="0"/>
-              </a:rPr>
-              <a:t>my_list.index</a:t>
-            </a:r>
+              <a:t>    print(“Zero”)</a:t>
+            </a:r>
+          </a:p>
+          <a:p>
+            <a:pPr marL="0" indent="0">
+              <a:spcBef>
+                <a:spcPts val="0"/>
+              </a:spcBef>
+              <a:buNone/>
+            </a:pPr>
             <a:r>
               <a:rPr lang="en-GB" dirty="0">
                 <a:solidFill>
@@ -14913,18 +14794,48 @@
                 <a:latin typeface="Courier New" panose="02070309020205020404" pitchFamily="49" charset="0"/>
                 <a:cs typeface="Courier New" panose="02070309020205020404" pitchFamily="49" charset="0"/>
               </a:rPr>
-              <a:t>(35)</a:t>
-            </a:r>
-          </a:p>
-          <a:p>
-            <a:pPr>
+              <a:t>    x -= 1</a:t>
+            </a:r>
+          </a:p>
+          <a:p>
+            <a:pPr marL="0" indent="0">
               <a:spcBef>
-                <a:spcPts val="1200"/>
+                <a:spcPts val="0"/>
               </a:spcBef>
+              <a:buNone/>
             </a:pPr>
+            <a:r>
+              <a:rPr lang="en-GB" dirty="0">
+                <a:solidFill>
+                  <a:srgbClr val="7030A0"/>
+                </a:solidFill>
+                <a:latin typeface="Courier New" panose="02070309020205020404" pitchFamily="49" charset="0"/>
+                <a:cs typeface="Courier New" panose="02070309020205020404" pitchFamily="49" charset="0"/>
+              </a:rPr>
+              <a:t>else:</a:t>
+            </a:r>
             <a:endParaRPr lang="en-GB" dirty="0">
+              <a:latin typeface="Courier New" panose="02070309020205020404" pitchFamily="49" charset="0"/>
               <a:cs typeface="Courier New" panose="02070309020205020404" pitchFamily="49" charset="0"/>
             </a:endParaRPr>
+          </a:p>
+          <a:p>
+            <a:pPr marL="0" indent="0">
+              <a:spcBef>
+                <a:spcPts val="0"/>
+              </a:spcBef>
+              <a:buNone/>
+            </a:pPr>
+            <a:r>
+              <a:rPr lang="en-GB" dirty="0">
+                <a:solidFill>
+                  <a:srgbClr val="7030A0"/>
+                </a:solidFill>
+                <a:latin typeface="Courier New" panose="02070309020205020404" pitchFamily="49" charset="0"/>
+                <a:cs typeface="Courier New" panose="02070309020205020404" pitchFamily="49" charset="0"/>
+              </a:rPr>
+              <a:t>    print(“Negative”)</a:t>
+            </a:r>
           </a:p>
         </p:txBody>
       </p:sp>
@@ -14959,8 +14870,8 @@
         </p:nvSpPr>
         <p:spPr>
           <a:xfrm>
-            <a:off x="5571242" y="755370"/>
-            <a:ext cx="5476170" cy="1015663"/>
+            <a:off x="6223819" y="679956"/>
+            <a:ext cx="4823592" cy="1015663"/>
           </a:xfrm>
           <a:prstGeom prst="rect">
             <a:avLst/>
@@ -14978,69 +14889,59 @@
               <a:rPr lang="en-GB" sz="2000" dirty="0">
                 <a:cs typeface="Courier New" panose="02070309020205020404" pitchFamily="49" charset="0"/>
               </a:rPr>
-              <a:t>Type help([function/object]) in the shell to see information about how to use the function/object, e.g. </a:t>
+              <a:t>Remember the </a:t>
+            </a:r>
+            <a:r>
+              <a:rPr lang="en-GB" sz="2000" b="1" dirty="0">
+                <a:cs typeface="Courier New" panose="02070309020205020404" pitchFamily="49" charset="0"/>
+              </a:rPr>
+              <a:t>colon</a:t>
             </a:r>
             <a:r>
               <a:rPr lang="en-GB" sz="2000" dirty="0">
-                <a:solidFill>
-                  <a:srgbClr val="7030A0"/>
-                </a:solidFill>
+                <a:cs typeface="Courier New" panose="02070309020205020404" pitchFamily="49" charset="0"/>
+              </a:rPr>
+              <a:t> after the </a:t>
+            </a:r>
+            <a:r>
+              <a:rPr lang="en-GB" sz="2000" dirty="0">
                 <a:latin typeface="Courier New" panose="02070309020205020404" pitchFamily="49" charset="0"/>
                 <a:cs typeface="Courier New" panose="02070309020205020404" pitchFamily="49" charset="0"/>
               </a:rPr>
-              <a:t>help(range)</a:t>
+              <a:t>if</a:t>
             </a:r>
             <a:r>
               <a:rPr lang="en-GB" sz="2000" dirty="0">
                 <a:cs typeface="Courier New" panose="02070309020205020404" pitchFamily="49" charset="0"/>
               </a:rPr>
-              <a:t>, </a:t>
-            </a:r>
-            <a:r>
-              <a:rPr lang="en-GB" sz="2000" dirty="0">
-                <a:solidFill>
-                  <a:srgbClr val="7030A0"/>
-                </a:solidFill>
-                <a:latin typeface="Courier New" panose="02070309020205020404" pitchFamily="49" charset="0"/>
+              <a:t> statement, and that an </a:t>
+            </a:r>
+            <a:r>
+              <a:rPr lang="en-GB" sz="2000" b="1" dirty="0">
                 <a:cs typeface="Courier New" panose="02070309020205020404" pitchFamily="49" charset="0"/>
               </a:rPr>
-              <a:t>help(</a:t>
-            </a:r>
-            <a:r>
-              <a:rPr lang="en-GB" sz="2000" dirty="0" err="1">
-                <a:solidFill>
-                  <a:srgbClr val="7030A0"/>
-                </a:solidFill>
-                <a:latin typeface="Courier New" panose="02070309020205020404" pitchFamily="49" charset="0"/>
-                <a:cs typeface="Courier New" panose="02070309020205020404" pitchFamily="49" charset="0"/>
-              </a:rPr>
-              <a:t>len</a:t>
-            </a:r>
-            <a:r>
-              <a:rPr lang="en-GB" sz="2000" dirty="0">
-                <a:solidFill>
-                  <a:srgbClr val="7030A0"/>
-                </a:solidFill>
-                <a:latin typeface="Courier New" panose="02070309020205020404" pitchFamily="49" charset="0"/>
-                <a:cs typeface="Courier New" panose="02070309020205020404" pitchFamily="49" charset="0"/>
-              </a:rPr>
-              <a:t>)</a:t>
+              <a:t>indent</a:t>
             </a:r>
             <a:r>
               <a:rPr lang="en-GB" sz="2000" dirty="0">
                 <a:cs typeface="Courier New" panose="02070309020205020404" pitchFamily="49" charset="0"/>
               </a:rPr>
-              <a:t>, </a:t>
-            </a:r>
-            <a:r>
-              <a:rPr lang="en-GB" sz="2000" dirty="0">
-                <a:solidFill>
-                  <a:srgbClr val="7030A0"/>
-                </a:solidFill>
-                <a:latin typeface="Courier New" panose="02070309020205020404" pitchFamily="49" charset="0"/>
+              <a:t> always follows a colon.</a:t>
+            </a:r>
+          </a:p>
+          <a:p>
+            <a:pPr algn="ctr"/>
+            <a:r>
+              <a:rPr lang="en-GB" sz="2000" b="1" dirty="0">
                 <a:cs typeface="Courier New" panose="02070309020205020404" pitchFamily="49" charset="0"/>
               </a:rPr>
-              <a:t>help(list)</a:t>
+              <a:t>Indentation</a:t>
+            </a:r>
+            <a:r>
+              <a:rPr lang="en-GB" sz="2000" dirty="0">
+                <a:cs typeface="Courier New" panose="02070309020205020404" pitchFamily="49" charset="0"/>
+              </a:rPr>
+              <a:t> is essential in Python.</a:t>
             </a:r>
           </a:p>
         </p:txBody>
@@ -15048,7 +14949,7 @@
     </p:spTree>
     <p:extLst>
       <p:ext uri="{BB962C8B-B14F-4D97-AF65-F5344CB8AC3E}">
-        <p14:creationId xmlns:p14="http://schemas.microsoft.com/office/powerpoint/2010/main" val="3124918447"/>
+        <p14:creationId xmlns:p14="http://schemas.microsoft.com/office/powerpoint/2010/main" val="2599195807"/>
       </p:ext>
     </p:extLst>
   </p:cSld>
@@ -15091,537 +14992,6 @@
           <a:lstStyle/>
           <a:p>
             <a:r>
-              <a:rPr lang="en-GB" dirty="0">
-                <a:latin typeface="+mn-lt"/>
-                <a:cs typeface="Courier New" panose="02070309020205020404" pitchFamily="49" charset="0"/>
-              </a:rPr>
-              <a:t>If</a:t>
-            </a:r>
-            <a:r>
-              <a:rPr lang="en-GB" dirty="0"/>
-              <a:t> Statements</a:t>
-            </a:r>
-          </a:p>
-        </p:txBody>
-      </p:sp>
-      <p:sp>
-        <p:nvSpPr>
-          <p:cNvPr id="3" name="Content Placeholder 2"/>
-          <p:cNvSpPr>
-            <a:spLocks noGrp="1"/>
-          </p:cNvSpPr>
-          <p:nvPr>
-            <p:ph idx="1"/>
-          </p:nvPr>
-        </p:nvSpPr>
-        <p:spPr>
-          <a:solidFill>
-            <a:srgbClr val="36AAC5"/>
-          </a:solidFill>
-        </p:spPr>
-        <p:txBody>
-          <a:bodyPr numCol="2">
-            <a:normAutofit lnSpcReduction="10000"/>
-          </a:bodyPr>
-          <a:lstStyle/>
-          <a:p>
-            <a:pPr marL="0" indent="0">
-              <a:spcBef>
-                <a:spcPts val="0"/>
-              </a:spcBef>
-              <a:buNone/>
-            </a:pPr>
-            <a:r>
-              <a:rPr lang="en-GB" dirty="0">
-                <a:solidFill>
-                  <a:srgbClr val="7030A0"/>
-                </a:solidFill>
-                <a:latin typeface="Courier New" panose="02070309020205020404" pitchFamily="49" charset="0"/>
-                <a:cs typeface="Courier New" panose="02070309020205020404" pitchFamily="49" charset="0"/>
-              </a:rPr>
-              <a:t>if </a:t>
-            </a:r>
-            <a:r>
-              <a:rPr lang="en-GB" dirty="0">
-                <a:solidFill>
-                  <a:srgbClr val="7030A0"/>
-                </a:solidFill>
-              </a:rPr>
-              <a:t>[condition]</a:t>
-            </a:r>
-            <a:r>
-              <a:rPr lang="en-GB" dirty="0">
-                <a:solidFill>
-                  <a:srgbClr val="7030A0"/>
-                </a:solidFill>
-                <a:latin typeface="Courier New" panose="02070309020205020404" pitchFamily="49" charset="0"/>
-                <a:cs typeface="Courier New" panose="02070309020205020404" pitchFamily="49" charset="0"/>
-              </a:rPr>
-              <a:t>:</a:t>
-            </a:r>
-          </a:p>
-          <a:p>
-            <a:pPr marL="0" indent="0">
-              <a:spcBef>
-                <a:spcPts val="0"/>
-              </a:spcBef>
-              <a:buNone/>
-            </a:pPr>
-            <a:r>
-              <a:rPr lang="en-GB" dirty="0">
-                <a:solidFill>
-                  <a:srgbClr val="7030A0"/>
-                </a:solidFill>
-              </a:rPr>
-              <a:t>    [do this]</a:t>
-            </a:r>
-          </a:p>
-          <a:p>
-            <a:pPr marL="0" indent="0">
-              <a:spcBef>
-                <a:spcPts val="0"/>
-              </a:spcBef>
-              <a:buNone/>
-            </a:pPr>
-            <a:r>
-              <a:rPr lang="en-GB" dirty="0" err="1">
-                <a:solidFill>
-                  <a:srgbClr val="7030A0"/>
-                </a:solidFill>
-                <a:latin typeface="Courier New" panose="02070309020205020404" pitchFamily="49" charset="0"/>
-                <a:cs typeface="Courier New" panose="02070309020205020404" pitchFamily="49" charset="0"/>
-              </a:rPr>
-              <a:t>elif</a:t>
-            </a:r>
-            <a:r>
-              <a:rPr lang="en-GB" dirty="0">
-                <a:solidFill>
-                  <a:srgbClr val="7030A0"/>
-                </a:solidFill>
-                <a:latin typeface="Courier New" panose="02070309020205020404" pitchFamily="49" charset="0"/>
-                <a:cs typeface="Courier New" panose="02070309020205020404" pitchFamily="49" charset="0"/>
-              </a:rPr>
-              <a:t> </a:t>
-            </a:r>
-            <a:r>
-              <a:rPr lang="en-GB" dirty="0">
-                <a:solidFill>
-                  <a:srgbClr val="7030A0"/>
-                </a:solidFill>
-              </a:rPr>
-              <a:t>[condition]</a:t>
-            </a:r>
-            <a:r>
-              <a:rPr lang="en-GB" dirty="0">
-                <a:solidFill>
-                  <a:srgbClr val="7030A0"/>
-                </a:solidFill>
-                <a:latin typeface="Courier New" panose="02070309020205020404" pitchFamily="49" charset="0"/>
-                <a:cs typeface="Courier New" panose="02070309020205020404" pitchFamily="49" charset="0"/>
-              </a:rPr>
-              <a:t>: </a:t>
-            </a:r>
-            <a:r>
-              <a:rPr lang="en-GB" dirty="0"/>
-              <a:t>(optional)</a:t>
-            </a:r>
-          </a:p>
-          <a:p>
-            <a:pPr marL="0" indent="0">
-              <a:spcBef>
-                <a:spcPts val="0"/>
-              </a:spcBef>
-              <a:buNone/>
-            </a:pPr>
-            <a:r>
-              <a:rPr lang="en-GB" dirty="0">
-                <a:solidFill>
-                  <a:srgbClr val="7030A0"/>
-                </a:solidFill>
-              </a:rPr>
-              <a:t>    [do this]</a:t>
-            </a:r>
-          </a:p>
-          <a:p>
-            <a:pPr marL="0" indent="0">
-              <a:spcBef>
-                <a:spcPts val="0"/>
-              </a:spcBef>
-              <a:buNone/>
-            </a:pPr>
-            <a:r>
-              <a:rPr lang="en-GB" dirty="0">
-                <a:solidFill>
-                  <a:srgbClr val="7030A0"/>
-                </a:solidFill>
-              </a:rPr>
-              <a:t>    [and this]</a:t>
-            </a:r>
-          </a:p>
-          <a:p>
-            <a:pPr marL="0" indent="0">
-              <a:spcBef>
-                <a:spcPts val="0"/>
-              </a:spcBef>
-              <a:buNone/>
-            </a:pPr>
-            <a:r>
-              <a:rPr lang="en-GB" dirty="0">
-                <a:solidFill>
-                  <a:srgbClr val="7030A0"/>
-                </a:solidFill>
-                <a:latin typeface="Courier New" panose="02070309020205020404" pitchFamily="49" charset="0"/>
-                <a:cs typeface="Courier New" panose="02070309020205020404" pitchFamily="49" charset="0"/>
-              </a:rPr>
-              <a:t>else: </a:t>
-            </a:r>
-            <a:r>
-              <a:rPr lang="en-GB" dirty="0"/>
-              <a:t>(optional)</a:t>
-            </a:r>
-          </a:p>
-          <a:p>
-            <a:pPr marL="0" indent="0">
-              <a:spcBef>
-                <a:spcPts val="0"/>
-              </a:spcBef>
-              <a:buNone/>
-            </a:pPr>
-            <a:r>
-              <a:rPr lang="en-GB" dirty="0">
-                <a:solidFill>
-                  <a:srgbClr val="7030A0"/>
-                </a:solidFill>
-              </a:rPr>
-              <a:t>    [do this]</a:t>
-            </a:r>
-          </a:p>
-          <a:p>
-            <a:pPr marL="0" indent="0">
-              <a:spcBef>
-                <a:spcPts val="0"/>
-              </a:spcBef>
-              <a:buNone/>
-            </a:pPr>
-            <a:endParaRPr lang="en-GB" dirty="0">
-              <a:solidFill>
-                <a:srgbClr val="7030A0"/>
-              </a:solidFill>
-            </a:endParaRPr>
-          </a:p>
-          <a:p>
-            <a:pPr marL="0" indent="0">
-              <a:spcBef>
-                <a:spcPts val="0"/>
-              </a:spcBef>
-              <a:buNone/>
-            </a:pPr>
-            <a:r>
-              <a:rPr lang="en-GB" dirty="0">
-                <a:solidFill>
-                  <a:srgbClr val="7030A0"/>
-                </a:solidFill>
-                <a:latin typeface="Courier New" panose="02070309020205020404" pitchFamily="49" charset="0"/>
-                <a:cs typeface="Courier New" panose="02070309020205020404" pitchFamily="49" charset="0"/>
-              </a:rPr>
-              <a:t>x = 1</a:t>
-            </a:r>
-          </a:p>
-          <a:p>
-            <a:pPr marL="0" indent="0">
-              <a:spcBef>
-                <a:spcPts val="0"/>
-              </a:spcBef>
-              <a:buNone/>
-            </a:pPr>
-            <a:r>
-              <a:rPr lang="en-GB" dirty="0">
-                <a:solidFill>
-                  <a:srgbClr val="7030A0"/>
-                </a:solidFill>
-                <a:latin typeface="Courier New" panose="02070309020205020404" pitchFamily="49" charset="0"/>
-                <a:cs typeface="Courier New" panose="02070309020205020404" pitchFamily="49" charset="0"/>
-              </a:rPr>
-              <a:t>if x &gt; 0:</a:t>
-            </a:r>
-          </a:p>
-          <a:p>
-            <a:pPr marL="0" indent="0">
-              <a:spcBef>
-                <a:spcPts val="0"/>
-              </a:spcBef>
-              <a:buNone/>
-            </a:pPr>
-            <a:r>
-              <a:rPr lang="en-GB" dirty="0">
-                <a:solidFill>
-                  <a:srgbClr val="7030A0"/>
-                </a:solidFill>
-                <a:latin typeface="Courier New" panose="02070309020205020404" pitchFamily="49" charset="0"/>
-                <a:cs typeface="Courier New" panose="02070309020205020404" pitchFamily="49" charset="0"/>
-              </a:rPr>
-              <a:t>    print(“Positive”)</a:t>
-            </a:r>
-          </a:p>
-          <a:p>
-            <a:pPr marL="0" indent="0">
-              <a:spcBef>
-                <a:spcPts val="0"/>
-              </a:spcBef>
-              <a:buNone/>
-            </a:pPr>
-            <a:r>
-              <a:rPr lang="en-GB" dirty="0" err="1">
-                <a:solidFill>
-                  <a:srgbClr val="7030A0"/>
-                </a:solidFill>
-                <a:latin typeface="Courier New" panose="02070309020205020404" pitchFamily="49" charset="0"/>
-                <a:cs typeface="Courier New" panose="02070309020205020404" pitchFamily="49" charset="0"/>
-              </a:rPr>
-              <a:t>elif</a:t>
-            </a:r>
-            <a:r>
-              <a:rPr lang="en-GB" dirty="0">
-                <a:solidFill>
-                  <a:srgbClr val="7030A0"/>
-                </a:solidFill>
-                <a:latin typeface="Courier New" panose="02070309020205020404" pitchFamily="49" charset="0"/>
-                <a:cs typeface="Courier New" panose="02070309020205020404" pitchFamily="49" charset="0"/>
-              </a:rPr>
-              <a:t> x == 0:</a:t>
-            </a:r>
-          </a:p>
-          <a:p>
-            <a:pPr marL="0" indent="0">
-              <a:spcBef>
-                <a:spcPts val="0"/>
-              </a:spcBef>
-              <a:buNone/>
-            </a:pPr>
-            <a:r>
-              <a:rPr lang="en-GB" dirty="0">
-                <a:solidFill>
-                  <a:srgbClr val="7030A0"/>
-                </a:solidFill>
-                <a:latin typeface="Courier New" panose="02070309020205020404" pitchFamily="49" charset="0"/>
-                <a:cs typeface="Courier New" panose="02070309020205020404" pitchFamily="49" charset="0"/>
-              </a:rPr>
-              <a:t>    print(“Zero”)</a:t>
-            </a:r>
-          </a:p>
-          <a:p>
-            <a:pPr marL="0" indent="0">
-              <a:spcBef>
-                <a:spcPts val="0"/>
-              </a:spcBef>
-              <a:buNone/>
-            </a:pPr>
-            <a:r>
-              <a:rPr lang="en-GB" dirty="0">
-                <a:solidFill>
-                  <a:srgbClr val="7030A0"/>
-                </a:solidFill>
-                <a:latin typeface="Courier New" panose="02070309020205020404" pitchFamily="49" charset="0"/>
-                <a:cs typeface="Courier New" panose="02070309020205020404" pitchFamily="49" charset="0"/>
-              </a:rPr>
-              <a:t>    x -= 1</a:t>
-            </a:r>
-          </a:p>
-          <a:p>
-            <a:pPr marL="0" indent="0">
-              <a:spcBef>
-                <a:spcPts val="0"/>
-              </a:spcBef>
-              <a:buNone/>
-            </a:pPr>
-            <a:r>
-              <a:rPr lang="en-GB" dirty="0">
-                <a:solidFill>
-                  <a:srgbClr val="7030A0"/>
-                </a:solidFill>
-                <a:latin typeface="Courier New" panose="02070309020205020404" pitchFamily="49" charset="0"/>
-                <a:cs typeface="Courier New" panose="02070309020205020404" pitchFamily="49" charset="0"/>
-              </a:rPr>
-              <a:t>else:</a:t>
-            </a:r>
-            <a:endParaRPr lang="en-GB" dirty="0">
-              <a:latin typeface="Courier New" panose="02070309020205020404" pitchFamily="49" charset="0"/>
-              <a:cs typeface="Courier New" panose="02070309020205020404" pitchFamily="49" charset="0"/>
-            </a:endParaRPr>
-          </a:p>
-          <a:p>
-            <a:pPr marL="0" indent="0">
-              <a:spcBef>
-                <a:spcPts val="0"/>
-              </a:spcBef>
-              <a:buNone/>
-            </a:pPr>
-            <a:r>
-              <a:rPr lang="en-GB" dirty="0">
-                <a:solidFill>
-                  <a:srgbClr val="7030A0"/>
-                </a:solidFill>
-                <a:latin typeface="Courier New" panose="02070309020205020404" pitchFamily="49" charset="0"/>
-                <a:cs typeface="Courier New" panose="02070309020205020404" pitchFamily="49" charset="0"/>
-              </a:rPr>
-              <a:t>    print(“Negative”)</a:t>
-            </a:r>
-          </a:p>
-        </p:txBody>
-      </p:sp>
-      <p:sp>
-        <p:nvSpPr>
-          <p:cNvPr id="4" name="Footer Placeholder 3"/>
-          <p:cNvSpPr>
-            <a:spLocks noGrp="1"/>
-          </p:cNvSpPr>
-          <p:nvPr>
-            <p:ph type="ftr" sz="quarter" idx="11"/>
-          </p:nvPr>
-        </p:nvSpPr>
-        <p:spPr/>
-        <p:txBody>
-          <a:bodyPr/>
-          <a:lstStyle/>
-          <a:p>
-            <a:r>
-              <a:rPr lang="en-US"/>
-              <a:t>lewis.gaul@seh.ox.ac.uk</a:t>
-            </a:r>
-            <a:endParaRPr lang="en-US" dirty="0"/>
-          </a:p>
-        </p:txBody>
-      </p:sp>
-      <p:sp>
-        <p:nvSpPr>
-          <p:cNvPr id="5" name="TextBox 4"/>
-          <p:cNvSpPr txBox="1"/>
-          <p:nvPr/>
-        </p:nvSpPr>
-        <p:spPr>
-          <a:xfrm>
-            <a:off x="6223819" y="679956"/>
-            <a:ext cx="4823592" cy="1015663"/>
-          </a:xfrm>
-          <a:prstGeom prst="rect">
-            <a:avLst/>
-          </a:prstGeom>
-          <a:noFill/>
-        </p:spPr>
-        <p:txBody>
-          <a:bodyPr wrap="square" rtlCol="0">
-            <a:spAutoFit/>
-          </a:bodyPr>
-          <a:lstStyle/>
-          <a:p>
-            <a:pPr algn="ctr"/>
-            <a:r>
-              <a:rPr lang="en-GB" sz="2000" dirty="0">
-                <a:cs typeface="Courier New" panose="02070309020205020404" pitchFamily="49" charset="0"/>
-              </a:rPr>
-              <a:t>Remember the </a:t>
-            </a:r>
-            <a:r>
-              <a:rPr lang="en-GB" sz="2000" b="1" dirty="0">
-                <a:cs typeface="Courier New" panose="02070309020205020404" pitchFamily="49" charset="0"/>
-              </a:rPr>
-              <a:t>colon</a:t>
-            </a:r>
-            <a:r>
-              <a:rPr lang="en-GB" sz="2000" dirty="0">
-                <a:cs typeface="Courier New" panose="02070309020205020404" pitchFamily="49" charset="0"/>
-              </a:rPr>
-              <a:t> after the </a:t>
-            </a:r>
-            <a:r>
-              <a:rPr lang="en-GB" sz="2000" dirty="0">
-                <a:latin typeface="Courier New" panose="02070309020205020404" pitchFamily="49" charset="0"/>
-                <a:cs typeface="Courier New" panose="02070309020205020404" pitchFamily="49" charset="0"/>
-              </a:rPr>
-              <a:t>if</a:t>
-            </a:r>
-            <a:r>
-              <a:rPr lang="en-GB" sz="2000" dirty="0">
-                <a:cs typeface="Courier New" panose="02070309020205020404" pitchFamily="49" charset="0"/>
-              </a:rPr>
-              <a:t> statement, and that an </a:t>
-            </a:r>
-            <a:r>
-              <a:rPr lang="en-GB" sz="2000" b="1" dirty="0">
-                <a:cs typeface="Courier New" panose="02070309020205020404" pitchFamily="49" charset="0"/>
-              </a:rPr>
-              <a:t>indent</a:t>
-            </a:r>
-            <a:r>
-              <a:rPr lang="en-GB" sz="2000" dirty="0">
-                <a:cs typeface="Courier New" panose="02070309020205020404" pitchFamily="49" charset="0"/>
-              </a:rPr>
-              <a:t> always follows a colon.</a:t>
-            </a:r>
-          </a:p>
-          <a:p>
-            <a:pPr algn="ctr"/>
-            <a:r>
-              <a:rPr lang="en-GB" sz="2000" b="1" dirty="0">
-                <a:cs typeface="Courier New" panose="02070309020205020404" pitchFamily="49" charset="0"/>
-              </a:rPr>
-              <a:t>Indentation</a:t>
-            </a:r>
-            <a:r>
-              <a:rPr lang="en-GB" sz="2000" dirty="0">
-                <a:cs typeface="Courier New" panose="02070309020205020404" pitchFamily="49" charset="0"/>
-              </a:rPr>
-              <a:t> is essential in Python.</a:t>
-            </a:r>
-          </a:p>
-        </p:txBody>
-      </p:sp>
-    </p:spTree>
-    <p:extLst>
-      <p:ext uri="{BB962C8B-B14F-4D97-AF65-F5344CB8AC3E}">
-        <p14:creationId xmlns:p14="http://schemas.microsoft.com/office/powerpoint/2010/main" val="2599195807"/>
-      </p:ext>
-    </p:extLst>
-  </p:cSld>
-  <p:clrMapOvr>
-    <a:masterClrMapping/>
-  </p:clrMapOvr>
-</p:sld>
-</file>
-
-<file path=ppt/slides/slide6.xml><?xml version="1.0" encoding="utf-8"?>
-<p:sld xmlns:a="http://schemas.openxmlformats.org/drawingml/2006/main" xmlns:r="http://schemas.openxmlformats.org/officeDocument/2006/relationships" xmlns:p="http://schemas.openxmlformats.org/presentationml/2006/main">
-  <p:cSld>
-    <p:spTree>
-      <p:nvGrpSpPr>
-        <p:cNvPr id="1" name=""/>
-        <p:cNvGrpSpPr/>
-        <p:nvPr/>
-      </p:nvGrpSpPr>
-      <p:grpSpPr>
-        <a:xfrm>
-          <a:off x="0" y="0"/>
-          <a:ext cx="0" cy="0"/>
-          <a:chOff x="0" y="0"/>
-          <a:chExt cx="0" cy="0"/>
-        </a:xfrm>
-      </p:grpSpPr>
-      <p:sp>
-        <p:nvSpPr>
-          <p:cNvPr id="2" name="Title 1"/>
-          <p:cNvSpPr>
-            <a:spLocks noGrp="1"/>
-          </p:cNvSpPr>
-          <p:nvPr>
-            <p:ph type="title"/>
-          </p:nvPr>
-        </p:nvSpPr>
-        <p:spPr/>
-        <p:txBody>
-          <a:bodyPr/>
-          <a:lstStyle/>
-          <a:p>
-            <a:r>
               <a:rPr lang="en-GB" dirty="0"/>
               <a:t>Loops</a:t>
             </a:r>
@@ -16170,7 +15540,7 @@
 </p:sld>
 </file>
 
-<file path=ppt/slides/slide7.xml><?xml version="1.0" encoding="utf-8"?>
+<file path=ppt/slides/slide6.xml><?xml version="1.0" encoding="utf-8"?>
 <p:sld xmlns:a="http://schemas.openxmlformats.org/drawingml/2006/main" xmlns:r="http://schemas.openxmlformats.org/officeDocument/2006/relationships" xmlns:p="http://schemas.openxmlformats.org/presentationml/2006/main">
   <p:cSld>
     <p:spTree>

</xml_diff>